<commit_message>
added additional isntructin slide
</commit_message>
<xml_diff>
--- a/public/js/tasks/social_media/media/Social_media_task_instructions_04_01_2022.pptx
+++ b/public/js/tasks/social_media/media/Social_media_task_instructions_04_01_2022.pptx
@@ -5,7 +5,7 @@
     <p:sldMasterId id="2147483660" r:id="rId1"/>
   </p:sldMasterIdLst>
   <p:notesMasterIdLst>
-    <p:notesMasterId r:id="rId33"/>
+    <p:notesMasterId r:id="rId34"/>
   </p:notesMasterIdLst>
   <p:sldIdLst>
     <p:sldId id="498" r:id="rId2"/>
@@ -34,11 +34,12 @@
     <p:sldId id="544" r:id="rId25"/>
     <p:sldId id="529" r:id="rId26"/>
     <p:sldId id="534" r:id="rId27"/>
-    <p:sldId id="530" r:id="rId28"/>
-    <p:sldId id="538" r:id="rId29"/>
-    <p:sldId id="540" r:id="rId30"/>
-    <p:sldId id="541" r:id="rId31"/>
-    <p:sldId id="545" r:id="rId32"/>
+    <p:sldId id="546" r:id="rId28"/>
+    <p:sldId id="530" r:id="rId29"/>
+    <p:sldId id="538" r:id="rId30"/>
+    <p:sldId id="540" r:id="rId31"/>
+    <p:sldId id="541" r:id="rId32"/>
+    <p:sldId id="545" r:id="rId33"/>
   </p:sldIdLst>
   <p:sldSz cx="12192000" cy="6858000"/>
   <p:notesSz cx="6858000" cy="9144000"/>
@@ -168,6 +169,7 @@
             <p14:sldId id="544"/>
             <p14:sldId id="529"/>
             <p14:sldId id="534"/>
+            <p14:sldId id="546"/>
             <p14:sldId id="530"/>
           </p14:sldIdLst>
         </p14:section>
@@ -285,7 +287,7 @@
           <a:p>
             <a:fld id="{5ACDFB13-8C7E-2148-B293-047F9641DD71}" type="datetimeFigureOut">
               <a:rPr lang="en-US" smtClean="0"/>
-              <a:t>7/1/22</a:t>
+              <a:t>7/5/22</a:t>
             </a:fld>
             <a:endParaRPr lang="en-US" dirty="0"/>
           </a:p>
@@ -2436,6 +2438,14 @@
           <a:bodyPr/>
           <a:lstStyle/>
           <a:p>
+            <a:r>
+              <a:rPr lang="en-US" dirty="0"/>
+              <a:t>Add screenshots of an X and an O</a:t>
+            </a:r>
+            <a:r>
+              <a:rPr lang="en-US" baseline="0" dirty="0"/>
+              <a:t> screen – like a timeline of screenshots.</a:t>
+            </a:r>
             <a:endParaRPr lang="en-US" dirty="0"/>
           </a:p>
         </p:txBody>
@@ -2455,18 +2465,78 @@
           <a:bodyPr/>
           <a:lstStyle/>
           <a:p>
+            <a:pPr marL="0" marR="0" lvl="0" indent="0" algn="r" defTabSz="457200" rtl="0" eaLnBrk="1" fontAlgn="auto" latinLnBrk="0" hangingPunct="1">
+              <a:lnSpc>
+                <a:spcPct val="100000"/>
+              </a:lnSpc>
+              <a:spcBef>
+                <a:spcPts val="0"/>
+              </a:spcBef>
+              <a:spcAft>
+                <a:spcPts val="0"/>
+              </a:spcAft>
+              <a:buClrTx/>
+              <a:buSzTx/>
+              <a:buFontTx/>
+              <a:buNone/>
+              <a:tabLst/>
+              <a:defRPr/>
+            </a:pPr>
             <a:fld id="{BCAE12D7-AE97-9243-8341-9A20FCA5A307}" type="slidenum">
-              <a:rPr lang="en-US" smtClean="0"/>
+              <a:rPr kumimoji="0" lang="en-US" sz="1200" b="0" i="0" u="none" strike="noStrike" kern="1200" cap="none" spc="0" normalizeH="0" baseline="0" noProof="0" smtClean="0">
+                <a:ln>
+                  <a:noFill/>
+                </a:ln>
+                <a:solidFill>
+                  <a:prstClr val="black"/>
+                </a:solidFill>
+                <a:effectLst/>
+                <a:uLnTx/>
+                <a:uFillTx/>
+                <a:latin typeface="Calibri"/>
+                <a:ea typeface="+mn-ea"/>
+                <a:cs typeface="+mn-cs"/>
+              </a:rPr>
+              <a:pPr marL="0" marR="0" lvl="0" indent="0" algn="r" defTabSz="457200" rtl="0" eaLnBrk="1" fontAlgn="auto" latinLnBrk="0" hangingPunct="1">
+                <a:lnSpc>
+                  <a:spcPct val="100000"/>
+                </a:lnSpc>
+                <a:spcBef>
+                  <a:spcPts val="0"/>
+                </a:spcBef>
+                <a:spcAft>
+                  <a:spcPts val="0"/>
+                </a:spcAft>
+                <a:buClrTx/>
+                <a:buSzTx/>
+                <a:buFontTx/>
+                <a:buNone/>
+                <a:tabLst/>
+                <a:defRPr/>
+              </a:pPr>
               <a:t>27</a:t>
             </a:fld>
-            <a:endParaRPr lang="en-US"/>
+            <a:endParaRPr kumimoji="0" lang="en-US" sz="1200" b="0" i="0" u="none" strike="noStrike" kern="1200" cap="none" spc="0" normalizeH="0" baseline="0" noProof="0">
+              <a:ln>
+                <a:noFill/>
+              </a:ln>
+              <a:solidFill>
+                <a:prstClr val="black"/>
+              </a:solidFill>
+              <a:effectLst/>
+              <a:uLnTx/>
+              <a:uFillTx/>
+              <a:latin typeface="Calibri"/>
+              <a:ea typeface="+mn-ea"/>
+              <a:cs typeface="+mn-cs"/>
+            </a:endParaRPr>
           </a:p>
         </p:txBody>
       </p:sp>
     </p:spTree>
     <p:extLst>
       <p:ext uri="{BB962C8B-B14F-4D97-AF65-F5344CB8AC3E}">
-        <p14:creationId xmlns:p14="http://schemas.microsoft.com/office/powerpoint/2010/main" val="3186647101"/>
+        <p14:creationId xmlns:p14="http://schemas.microsoft.com/office/powerpoint/2010/main" val="2337951061"/>
       </p:ext>
     </p:extLst>
   </p:cSld>
@@ -2525,10 +2595,7 @@
           <a:bodyPr/>
           <a:lstStyle/>
           <a:p>
-            <a:r>
-              <a:rPr lang="en-US" dirty="0"/>
-              <a:t>Add screen shot</a:t>
-            </a:r>
+            <a:endParaRPr lang="en-US" dirty="0"/>
           </a:p>
         </p:txBody>
       </p:sp>
@@ -2558,7 +2625,7 @@
     </p:spTree>
     <p:extLst>
       <p:ext uri="{BB962C8B-B14F-4D97-AF65-F5344CB8AC3E}">
-        <p14:creationId xmlns:p14="http://schemas.microsoft.com/office/powerpoint/2010/main" val="1620608549"/>
+        <p14:creationId xmlns:p14="http://schemas.microsoft.com/office/powerpoint/2010/main" val="3186647101"/>
       </p:ext>
     </p:extLst>
   </p:cSld>
@@ -2617,7 +2684,10 @@
           <a:bodyPr/>
           <a:lstStyle/>
           <a:p>
-            <a:endParaRPr lang="en-US" dirty="0"/>
+            <a:r>
+              <a:rPr lang="en-US" dirty="0"/>
+              <a:t>Add screen shot</a:t>
+            </a:r>
           </a:p>
         </p:txBody>
       </p:sp>
@@ -2647,7 +2717,7 @@
     </p:spTree>
     <p:extLst>
       <p:ext uri="{BB962C8B-B14F-4D97-AF65-F5344CB8AC3E}">
-        <p14:creationId xmlns:p14="http://schemas.microsoft.com/office/powerpoint/2010/main" val="3372806075"/>
+        <p14:creationId xmlns:p14="http://schemas.microsoft.com/office/powerpoint/2010/main" val="1620608549"/>
       </p:ext>
     </p:extLst>
   </p:cSld>
@@ -2833,7 +2903,7 @@
     </p:spTree>
     <p:extLst>
       <p:ext uri="{BB962C8B-B14F-4D97-AF65-F5344CB8AC3E}">
-        <p14:creationId xmlns:p14="http://schemas.microsoft.com/office/powerpoint/2010/main" val="3223258865"/>
+        <p14:creationId xmlns:p14="http://schemas.microsoft.com/office/powerpoint/2010/main" val="3372806075"/>
       </p:ext>
     </p:extLst>
   </p:cSld>
@@ -2892,14 +2962,6 @@
           <a:bodyPr/>
           <a:lstStyle/>
           <a:p>
-            <a:r>
-              <a:rPr lang="en-US" dirty="0"/>
-              <a:t>Add screenshots of an X and an O</a:t>
-            </a:r>
-            <a:r>
-              <a:rPr lang="en-US" baseline="0" dirty="0"/>
-              <a:t> screen – like a timeline of screenshots.</a:t>
-            </a:r>
             <a:endParaRPr lang="en-US" dirty="0"/>
           </a:p>
         </p:txBody>
@@ -2922,6 +2984,103 @@
             <a:fld id="{BCAE12D7-AE97-9243-8341-9A20FCA5A307}" type="slidenum">
               <a:rPr lang="en-US" smtClean="0"/>
               <a:t>31</a:t>
+            </a:fld>
+            <a:endParaRPr lang="en-US"/>
+          </a:p>
+        </p:txBody>
+      </p:sp>
+    </p:spTree>
+    <p:extLst>
+      <p:ext uri="{BB962C8B-B14F-4D97-AF65-F5344CB8AC3E}">
+        <p14:creationId xmlns:p14="http://schemas.microsoft.com/office/powerpoint/2010/main" val="3223258865"/>
+      </p:ext>
+    </p:extLst>
+  </p:cSld>
+  <p:clrMapOvr>
+    <a:masterClrMapping/>
+  </p:clrMapOvr>
+</p:notes>
+</file>
+
+<file path=ppt/notesSlides/notesSlide32.xml><?xml version="1.0" encoding="utf-8"?>
+<p:notes xmlns:a="http://schemas.openxmlformats.org/drawingml/2006/main" xmlns:r="http://schemas.openxmlformats.org/officeDocument/2006/relationships" xmlns:p="http://schemas.openxmlformats.org/presentationml/2006/main">
+  <p:cSld>
+    <p:spTree>
+      <p:nvGrpSpPr>
+        <p:cNvPr id="1" name=""/>
+        <p:cNvGrpSpPr/>
+        <p:nvPr/>
+      </p:nvGrpSpPr>
+      <p:grpSpPr>
+        <a:xfrm>
+          <a:off x="0" y="0"/>
+          <a:ext cx="0" cy="0"/>
+          <a:chOff x="0" y="0"/>
+          <a:chExt cx="0" cy="0"/>
+        </a:xfrm>
+      </p:grpSpPr>
+      <p:sp>
+        <p:nvSpPr>
+          <p:cNvPr id="2" name="Slide Image Placeholder 1"/>
+          <p:cNvSpPr>
+            <a:spLocks noGrp="1" noRot="1" noChangeAspect="1"/>
+          </p:cNvSpPr>
+          <p:nvPr>
+            <p:ph type="sldImg"/>
+          </p:nvPr>
+        </p:nvSpPr>
+        <p:spPr>
+          <a:xfrm>
+            <a:off x="381000" y="685800"/>
+            <a:ext cx="6096000" cy="3429000"/>
+          </a:xfrm>
+        </p:spPr>
+      </p:sp>
+      <p:sp>
+        <p:nvSpPr>
+          <p:cNvPr id="3" name="Notes Placeholder 2"/>
+          <p:cNvSpPr>
+            <a:spLocks noGrp="1"/>
+          </p:cNvSpPr>
+          <p:nvPr>
+            <p:ph type="body" idx="1"/>
+          </p:nvPr>
+        </p:nvSpPr>
+        <p:spPr/>
+        <p:txBody>
+          <a:bodyPr/>
+          <a:lstStyle/>
+          <a:p>
+            <a:r>
+              <a:rPr lang="en-US" dirty="0"/>
+              <a:t>Add screenshots of an X and an O</a:t>
+            </a:r>
+            <a:r>
+              <a:rPr lang="en-US" baseline="0" dirty="0"/>
+              <a:t> screen – like a timeline of screenshots.</a:t>
+            </a:r>
+            <a:endParaRPr lang="en-US" dirty="0"/>
+          </a:p>
+        </p:txBody>
+      </p:sp>
+      <p:sp>
+        <p:nvSpPr>
+          <p:cNvPr id="4" name="Slide Number Placeholder 3"/>
+          <p:cNvSpPr>
+            <a:spLocks noGrp="1"/>
+          </p:cNvSpPr>
+          <p:nvPr>
+            <p:ph type="sldNum" sz="quarter" idx="10"/>
+          </p:nvPr>
+        </p:nvSpPr>
+        <p:spPr/>
+        <p:txBody>
+          <a:bodyPr/>
+          <a:lstStyle/>
+          <a:p>
+            <a:fld id="{BCAE12D7-AE97-9243-8341-9A20FCA5A307}" type="slidenum">
+              <a:rPr lang="en-US" smtClean="0"/>
+              <a:t>32</a:t>
             </a:fld>
             <a:endParaRPr lang="en-US"/>
           </a:p>
@@ -3696,7 +3855,7 @@
           <a:p>
             <a:fld id="{E69A4D3A-6EF8-7448-AC6F-AD52FEDAA6A8}" type="datetimeFigureOut">
               <a:rPr lang="en-US" smtClean="0"/>
-              <a:t>7/1/22</a:t>
+              <a:t>7/5/22</a:t>
             </a:fld>
             <a:endParaRPr lang="en-US" dirty="0"/>
           </a:p>
@@ -3864,7 +4023,7 @@
           <a:p>
             <a:fld id="{E69A4D3A-6EF8-7448-AC6F-AD52FEDAA6A8}" type="datetimeFigureOut">
               <a:rPr lang="en-US" smtClean="0"/>
-              <a:t>7/1/22</a:t>
+              <a:t>7/5/22</a:t>
             </a:fld>
             <a:endParaRPr lang="en-US" dirty="0"/>
           </a:p>
@@ -4042,7 +4201,7 @@
           <a:p>
             <a:fld id="{E69A4D3A-6EF8-7448-AC6F-AD52FEDAA6A8}" type="datetimeFigureOut">
               <a:rPr lang="en-US" smtClean="0"/>
-              <a:t>7/1/22</a:t>
+              <a:t>7/5/22</a:t>
             </a:fld>
             <a:endParaRPr lang="en-US" dirty="0"/>
           </a:p>
@@ -4210,7 +4369,7 @@
           <a:p>
             <a:fld id="{E69A4D3A-6EF8-7448-AC6F-AD52FEDAA6A8}" type="datetimeFigureOut">
               <a:rPr lang="en-US" smtClean="0"/>
-              <a:t>7/1/22</a:t>
+              <a:t>7/5/22</a:t>
             </a:fld>
             <a:endParaRPr lang="en-US" dirty="0"/>
           </a:p>
@@ -4455,7 +4614,7 @@
           <a:p>
             <a:fld id="{E69A4D3A-6EF8-7448-AC6F-AD52FEDAA6A8}" type="datetimeFigureOut">
               <a:rPr lang="en-US" smtClean="0"/>
-              <a:t>7/1/22</a:t>
+              <a:t>7/5/22</a:t>
             </a:fld>
             <a:endParaRPr lang="en-US" dirty="0"/>
           </a:p>
@@ -4740,7 +4899,7 @@
           <a:p>
             <a:fld id="{E69A4D3A-6EF8-7448-AC6F-AD52FEDAA6A8}" type="datetimeFigureOut">
               <a:rPr lang="en-US" smtClean="0"/>
-              <a:t>7/1/22</a:t>
+              <a:t>7/5/22</a:t>
             </a:fld>
             <a:endParaRPr lang="en-US" dirty="0"/>
           </a:p>
@@ -5159,7 +5318,7 @@
           <a:p>
             <a:fld id="{E69A4D3A-6EF8-7448-AC6F-AD52FEDAA6A8}" type="datetimeFigureOut">
               <a:rPr lang="en-US" smtClean="0"/>
-              <a:t>7/1/22</a:t>
+              <a:t>7/5/22</a:t>
             </a:fld>
             <a:endParaRPr lang="en-US" dirty="0"/>
           </a:p>
@@ -5276,7 +5435,7 @@
           <a:p>
             <a:fld id="{E69A4D3A-6EF8-7448-AC6F-AD52FEDAA6A8}" type="datetimeFigureOut">
               <a:rPr lang="en-US" smtClean="0"/>
-              <a:t>7/1/22</a:t>
+              <a:t>7/5/22</a:t>
             </a:fld>
             <a:endParaRPr lang="en-US" dirty="0"/>
           </a:p>
@@ -5371,7 +5530,7 @@
           <a:p>
             <a:fld id="{E69A4D3A-6EF8-7448-AC6F-AD52FEDAA6A8}" type="datetimeFigureOut">
               <a:rPr lang="en-US" smtClean="0"/>
-              <a:t>7/1/22</a:t>
+              <a:t>7/5/22</a:t>
             </a:fld>
             <a:endParaRPr lang="en-US" dirty="0"/>
           </a:p>
@@ -5646,7 +5805,7 @@
           <a:p>
             <a:fld id="{E69A4D3A-6EF8-7448-AC6F-AD52FEDAA6A8}" type="datetimeFigureOut">
               <a:rPr lang="en-US" smtClean="0"/>
-              <a:t>7/1/22</a:t>
+              <a:t>7/5/22</a:t>
             </a:fld>
             <a:endParaRPr lang="en-US" dirty="0"/>
           </a:p>
@@ -5901,7 +6060,7 @@
           <a:p>
             <a:fld id="{E69A4D3A-6EF8-7448-AC6F-AD52FEDAA6A8}" type="datetimeFigureOut">
               <a:rPr lang="en-US" smtClean="0"/>
-              <a:t>7/1/22</a:t>
+              <a:t>7/5/22</a:t>
             </a:fld>
             <a:endParaRPr lang="en-US" dirty="0"/>
           </a:p>
@@ -6115,7 +6274,7 @@
           <a:p>
             <a:fld id="{E69A4D3A-6EF8-7448-AC6F-AD52FEDAA6A8}" type="datetimeFigureOut">
               <a:rPr lang="en-US" smtClean="0"/>
-              <a:t>7/1/22</a:t>
+              <a:t>7/5/22</a:t>
             </a:fld>
             <a:endParaRPr lang="en-US" dirty="0"/>
           </a:p>
@@ -20692,8 +20851,8 @@
         </p:nvSpPr>
         <p:spPr>
           <a:xfrm>
-            <a:off x="1794076" y="473172"/>
-            <a:ext cx="9051402" cy="1379691"/>
+            <a:off x="1400536" y="285535"/>
+            <a:ext cx="9919505" cy="3298728"/>
           </a:xfrm>
           <a:ln>
             <a:noFill/>
@@ -20709,11 +20868,23 @@
               <a:buNone/>
             </a:pPr>
             <a:r>
-              <a:rPr lang="en-US" dirty="0"/>
-              <a:t>So to be sure that everything makes sense let’s work through a few example </a:t>
-            </a:r>
-            <a:r>
-              <a:rPr lang="en-US" dirty="0">
+              <a:rPr lang="en-US" sz="2400" dirty="0"/>
+              <a:t>Instead of “</a:t>
+            </a:r>
+            <a:r>
+              <a:rPr lang="en-US" sz="2400" dirty="0">
+                <a:solidFill>
+                  <a:srgbClr val="00FDFF"/>
+                </a:solidFill>
+              </a:rPr>
+              <a:t>likes</a:t>
+            </a:r>
+            <a:r>
+              <a:rPr lang="en-US" sz="2400" dirty="0"/>
+              <a:t>”, sometimes you will also enter </a:t>
+            </a:r>
+            <a:r>
+              <a:rPr lang="en-US" sz="2400" dirty="0">
                 <a:solidFill>
                   <a:srgbClr val="00FF00"/>
                 </a:solidFill>
@@ -20721,15 +20892,114 @@
               <a:t>chatrooms</a:t>
             </a:r>
             <a:r>
-              <a:rPr lang="en-US" dirty="0"/>
-              <a:t>.</a:t>
+              <a:rPr lang="en-US" sz="2400" dirty="0"/>
+              <a:t> where people indicate “</a:t>
+            </a:r>
+            <a:r>
+              <a:rPr lang="en-US" sz="2400" dirty="0">
+                <a:solidFill>
+                  <a:srgbClr val="FF0000"/>
+                </a:solidFill>
+              </a:rPr>
+              <a:t>dislikes</a:t>
+            </a:r>
+            <a:r>
+              <a:rPr lang="en-US" sz="2400" dirty="0"/>
+              <a:t>”.  The “</a:t>
+            </a:r>
+            <a:r>
+              <a:rPr lang="en-US" sz="2400" dirty="0">
+                <a:solidFill>
+                  <a:srgbClr val="FF0000"/>
+                </a:solidFill>
+              </a:rPr>
+              <a:t>dislikes</a:t>
+            </a:r>
+            <a:r>
+              <a:rPr lang="en-US" sz="2400" dirty="0"/>
+              <a:t>” will be shown as negative numbers. These numbers will be negative because every “</a:t>
+            </a:r>
+            <a:r>
+              <a:rPr lang="en-US" sz="2400" dirty="0">
+                <a:solidFill>
+                  <a:srgbClr val="FF0000"/>
+                </a:solidFill>
+              </a:rPr>
+              <a:t>dislike</a:t>
+            </a:r>
+            <a:r>
+              <a:rPr lang="en-US" sz="2400" dirty="0"/>
+              <a:t>” you receive will reduce your overall “</a:t>
+            </a:r>
+            <a:r>
+              <a:rPr lang="en-US" sz="2400" dirty="0">
+                <a:solidFill>
+                  <a:srgbClr val="00FDFF"/>
+                </a:solidFill>
+              </a:rPr>
+              <a:t>social approval score</a:t>
+            </a:r>
+            <a:r>
+              <a:rPr lang="en-US" sz="2400" dirty="0"/>
+              <a:t>”. For example, if you had gotten a total of 350 “likes” in the first chatroom, and then you got a -50 in the next chatroom, then you would now only have 300 total “</a:t>
+            </a:r>
+            <a:r>
+              <a:rPr lang="en-US" sz="2400" dirty="0">
+                <a:solidFill>
+                  <a:srgbClr val="00FDFF"/>
+                </a:solidFill>
+              </a:rPr>
+              <a:t>likes</a:t>
+            </a:r>
+            <a:r>
+              <a:rPr lang="en-US" sz="2400" dirty="0"/>
+              <a:t>”.</a:t>
             </a:r>
           </a:p>
           <a:p>
             <a:pPr marL="0" indent="0">
               <a:buNone/>
             </a:pPr>
-            <a:endParaRPr lang="en-US" dirty="0"/>
+            <a:endParaRPr lang="en-US" sz="2400" dirty="0"/>
+          </a:p>
+          <a:p>
+            <a:pPr marL="0" indent="0">
+              <a:buNone/>
+            </a:pPr>
+            <a:r>
+              <a:rPr lang="en-US" sz="2400" dirty="0"/>
+              <a:t>Text shown on the right side of the screen will indicate whether the current chatroom  will have “</a:t>
+            </a:r>
+            <a:r>
+              <a:rPr lang="en-US" sz="2400" dirty="0">
+                <a:solidFill>
+                  <a:srgbClr val="00FDFF"/>
+                </a:solidFill>
+              </a:rPr>
+              <a:t>likes</a:t>
+            </a:r>
+            <a:r>
+              <a:rPr lang="en-US" sz="2400" dirty="0"/>
+              <a:t>” or “</a:t>
+            </a:r>
+            <a:r>
+              <a:rPr lang="en-US" sz="2400" dirty="0">
+                <a:solidFill>
+                  <a:srgbClr val="FF0000"/>
+                </a:solidFill>
+              </a:rPr>
+              <a:t>dislikes</a:t>
+            </a:r>
+            <a:r>
+              <a:rPr lang="en-US" sz="2400" dirty="0"/>
+              <a:t>”.</a:t>
+            </a:r>
+          </a:p>
+          <a:p>
+            <a:pPr marL="0" indent="0" algn="ctr">
+              <a:buNone/>
+            </a:pPr>
+            <a:endParaRPr lang="en-US" sz="2400" dirty="0"/>
           </a:p>
         </p:txBody>
       </p:sp>
@@ -20771,11 +21041,37 @@
             </a:lvl1pPr>
           </a:lstStyle>
           <a:p>
-            <a:r>
-              <a:rPr lang="en-US" sz="3000" dirty="0">
+            <a:pPr marL="0" marR="0" lvl="0" indent="0" algn="ctr" defTabSz="914400" rtl="0" eaLnBrk="1" fontAlgn="auto" latinLnBrk="0" hangingPunct="1">
+              <a:lnSpc>
+                <a:spcPct val="100000"/>
+              </a:lnSpc>
+              <a:spcBef>
+                <a:spcPct val="0"/>
+              </a:spcBef>
+              <a:spcAft>
+                <a:spcPts val="0"/>
+              </a:spcAft>
+              <a:buClrTx/>
+              <a:buSzTx/>
+              <a:buFontTx/>
+              <a:buNone/>
+              <a:tabLst/>
+              <a:defRPr/>
+            </a:pPr>
+            <a:r>
+              <a:rPr kumimoji="0" lang="en-US" sz="3000" b="0" i="0" u="none" strike="noStrike" kern="1200" cap="none" spc="0" normalizeH="0" baseline="0" noProof="0" dirty="0">
+                <a:ln>
+                  <a:noFill/>
+                </a:ln>
                 <a:solidFill>
                   <a:srgbClr val="FF0000"/>
                 </a:solidFill>
+                <a:effectLst/>
+                <a:uLnTx/>
+                <a:uFillTx/>
+                <a:latin typeface="Calibri"/>
+                <a:ea typeface="+mj-ea"/>
+                <a:cs typeface="+mj-cs"/>
               </a:rPr>
               <a:t>PRESS THE RIGHT BUTTON TO CONTINUE</a:t>
             </a:r>
@@ -20959,11 +21255,37 @@
             </a:lvl9pPr>
           </a:lstStyle>
           <a:p>
-            <a:r>
-              <a:rPr lang="en-US" sz="1600" dirty="0">
-                <a:solidFill>
-                  <a:schemeClr val="tx1"/>
-                </a:solidFill>
+            <a:pPr marL="0" marR="0" lvl="0" indent="0" algn="ctr" defTabSz="914400" rtl="0" eaLnBrk="1" fontAlgn="auto" latinLnBrk="0" hangingPunct="1">
+              <a:lnSpc>
+                <a:spcPct val="100000"/>
+              </a:lnSpc>
+              <a:spcBef>
+                <a:spcPct val="20000"/>
+              </a:spcBef>
+              <a:spcAft>
+                <a:spcPts val="0"/>
+              </a:spcAft>
+              <a:buClrTx/>
+              <a:buSzTx/>
+              <a:buFont typeface="Arial" pitchFamily="34" charset="0"/>
+              <a:buNone/>
+              <a:tabLst/>
+              <a:defRPr/>
+            </a:pPr>
+            <a:r>
+              <a:rPr kumimoji="0" lang="en-US" sz="1600" b="0" i="0" u="none" strike="noStrike" kern="1200" cap="none" spc="0" normalizeH="0" baseline="0" noProof="0" dirty="0">
+                <a:ln>
+                  <a:noFill/>
+                </a:ln>
+                <a:solidFill>
+                  <a:prstClr val="white"/>
+                </a:solidFill>
+                <a:effectLst/>
+                <a:uLnTx/>
+                <a:uFillTx/>
+                <a:latin typeface="Calibri"/>
+                <a:ea typeface="+mn-ea"/>
+                <a:cs typeface="+mn-cs"/>
               </a:rPr>
               <a:t>RIGHT</a:t>
             </a:r>
@@ -21009,17 +21331,46 @@
           <a:bodyPr rtlCol="0" anchor="ctr"/>
           <a:lstStyle/>
           <a:p>
-            <a:pPr algn="ctr"/>
-            <a:endParaRPr lang="en-US"/>
+            <a:pPr marL="0" marR="0" lvl="0" indent="0" algn="ctr" defTabSz="457200" rtl="0" eaLnBrk="1" fontAlgn="auto" latinLnBrk="0" hangingPunct="1">
+              <a:lnSpc>
+                <a:spcPct val="100000"/>
+              </a:lnSpc>
+              <a:spcBef>
+                <a:spcPts val="0"/>
+              </a:spcBef>
+              <a:spcAft>
+                <a:spcPts val="0"/>
+              </a:spcAft>
+              <a:buClrTx/>
+              <a:buSzTx/>
+              <a:buFontTx/>
+              <a:buNone/>
+              <a:tabLst/>
+              <a:defRPr/>
+            </a:pPr>
+            <a:endParaRPr kumimoji="0" lang="en-US" sz="1800" b="0" i="0" u="none" strike="noStrike" kern="1200" cap="none" spc="0" normalizeH="0" baseline="0" noProof="0">
+              <a:ln>
+                <a:noFill/>
+              </a:ln>
+              <a:solidFill>
+                <a:prstClr val="white"/>
+              </a:solidFill>
+              <a:effectLst/>
+              <a:uLnTx/>
+              <a:uFillTx/>
+              <a:latin typeface="Calibri"/>
+              <a:ea typeface="+mn-ea"/>
+              <a:cs typeface="+mn-cs"/>
+            </a:endParaRPr>
           </a:p>
         </p:txBody>
       </p:sp>
       <p:pic>
         <p:nvPicPr>
-          <p:cNvPr id="8" name="Picture 7" descr="Graphical user interface&#10;&#10;Description automatically generated">
+          <p:cNvPr id="4" name="Picture 3" descr="Graphical user interface, website&#10;&#10;Description automatically generated">
             <a:extLst>
               <a:ext uri="{FF2B5EF4-FFF2-40B4-BE49-F238E27FC236}">
-                <a16:creationId xmlns:a16="http://schemas.microsoft.com/office/drawing/2014/main" id="{A77AD95F-E386-C04B-B4F1-084B641B1C88}"/>
+                <a16:creationId xmlns:a16="http://schemas.microsoft.com/office/drawing/2014/main" id="{0F2ECFCF-775B-6249-8F94-0AE6566E9DB5}"/>
               </a:ext>
             </a:extLst>
           </p:cNvPr>
@@ -21028,226 +21379,33 @@
           </p:cNvPicPr>
           <p:nvPr/>
         </p:nvPicPr>
-        <p:blipFill rotWithShape="1">
+        <p:blipFill>
           <a:blip r:embed="rId3"/>
-          <a:srcRect t="36427"/>
-          <a:stretch/>
+          <a:stretch>
+            <a:fillRect/>
+          </a:stretch>
         </p:blipFill>
         <p:spPr>
           <a:xfrm>
-            <a:off x="3062508" y="2550695"/>
-            <a:ext cx="5626100" cy="904258"/>
+            <a:off x="3668891" y="3997695"/>
+            <a:ext cx="4483869" cy="2076149"/>
           </a:xfrm>
           <a:prstGeom prst="rect">
-            <a:avLst/>
-          </a:prstGeom>
-        </p:spPr>
-      </p:pic>
-      <p:cxnSp>
-        <p:nvCxnSpPr>
-          <p:cNvPr id="9" name="Straight Arrow Connector 8">
-            <a:extLst>
-              <a:ext uri="{FF2B5EF4-FFF2-40B4-BE49-F238E27FC236}">
-                <a16:creationId xmlns:a16="http://schemas.microsoft.com/office/drawing/2014/main" id="{5B1CA22A-CD91-E940-BE65-2E10126871FE}"/>
-              </a:ext>
-            </a:extLst>
-          </p:cNvPr>
-          <p:cNvCxnSpPr>
-            <a:cxnSpLocks/>
-            <a:stCxn id="10" idx="0"/>
-          </p:cNvCxnSpPr>
-          <p:nvPr/>
-        </p:nvCxnSpPr>
-        <p:spPr>
-          <a:xfrm flipV="1">
-            <a:off x="4119084" y="3454953"/>
-            <a:ext cx="0" cy="477541"/>
-          </a:xfrm>
-          <a:prstGeom prst="straightConnector1">
-            <a:avLst/>
-          </a:prstGeom>
-          <a:ln>
-            <a:tailEnd type="triangle"/>
-          </a:ln>
-        </p:spPr>
-        <p:style>
-          <a:lnRef idx="1">
-            <a:schemeClr val="accent1"/>
-          </a:lnRef>
-          <a:fillRef idx="0">
-            <a:schemeClr val="accent1"/>
-          </a:fillRef>
-          <a:effectRef idx="0">
-            <a:schemeClr val="accent1"/>
-          </a:effectRef>
-          <a:fontRef idx="minor">
-            <a:schemeClr val="tx1"/>
-          </a:fontRef>
-        </p:style>
-      </p:cxnSp>
-      <p:sp>
-        <p:nvSpPr>
-          <p:cNvPr id="10" name="Rectangle 9">
-            <a:extLst>
-              <a:ext uri="{FF2B5EF4-FFF2-40B4-BE49-F238E27FC236}">
-                <a16:creationId xmlns:a16="http://schemas.microsoft.com/office/drawing/2014/main" id="{CA3AF63F-0AF3-B94B-B308-4DFAD06FE454}"/>
-              </a:ext>
-            </a:extLst>
-          </p:cNvPr>
-          <p:cNvSpPr/>
-          <p:nvPr/>
-        </p:nvSpPr>
-        <p:spPr>
-          <a:xfrm>
-            <a:off x="3747124" y="3932494"/>
-            <a:ext cx="743919" cy="666710"/>
-          </a:xfrm>
-          <a:prstGeom prst="rect">
-            <a:avLst/>
-          </a:prstGeom>
-          <a:solidFill>
-            <a:schemeClr val="accent1"/>
-          </a:solidFill>
-          <a:ln>
-            <a:noFill/>
-          </a:ln>
-        </p:spPr>
-        <p:style>
-          <a:lnRef idx="2">
-            <a:schemeClr val="accent1">
-              <a:shade val="50000"/>
-            </a:schemeClr>
-          </a:lnRef>
-          <a:fillRef idx="1">
-            <a:schemeClr val="accent1"/>
-          </a:fillRef>
-          <a:effectRef idx="0">
-            <a:schemeClr val="accent1"/>
-          </a:effectRef>
-          <a:fontRef idx="minor">
-            <a:schemeClr val="lt1"/>
-          </a:fontRef>
-        </p:style>
-        <p:txBody>
-          <a:bodyPr rtlCol="0" anchor="ctr"/>
-          <a:lstStyle/>
-          <a:p>
-            <a:pPr algn="ctr"/>
-            <a:r>
-              <a:rPr lang="en-US" dirty="0"/>
-              <a:t>“&lt;“ Key</a:t>
-            </a:r>
-          </a:p>
-        </p:txBody>
-      </p:sp>
-      <p:cxnSp>
-        <p:nvCxnSpPr>
-          <p:cNvPr id="11" name="Straight Arrow Connector 10">
-            <a:extLst>
-              <a:ext uri="{FF2B5EF4-FFF2-40B4-BE49-F238E27FC236}">
-                <a16:creationId xmlns:a16="http://schemas.microsoft.com/office/drawing/2014/main" id="{E363D8C6-6470-804D-B1C3-71BF6E1F4D7A}"/>
-              </a:ext>
-            </a:extLst>
-          </p:cNvPr>
-          <p:cNvCxnSpPr>
-            <a:cxnSpLocks/>
-            <a:stCxn id="14" idx="0"/>
-          </p:cNvCxnSpPr>
-          <p:nvPr/>
-        </p:nvCxnSpPr>
-        <p:spPr>
-          <a:xfrm flipV="1">
-            <a:off x="7381693" y="3404647"/>
-            <a:ext cx="0" cy="477541"/>
-          </a:xfrm>
-          <a:prstGeom prst="straightConnector1">
             <a:avLst/>
           </a:prstGeom>
           <a:ln>
             <a:solidFill>
-              <a:schemeClr val="accent6"/>
+              <a:schemeClr val="tx1"/>
             </a:solidFill>
-            <a:tailEnd type="triangle"/>
           </a:ln>
         </p:spPr>
-        <p:style>
-          <a:lnRef idx="1">
-            <a:schemeClr val="accent1"/>
-          </a:lnRef>
-          <a:fillRef idx="0">
-            <a:schemeClr val="accent1"/>
-          </a:fillRef>
-          <a:effectRef idx="0">
-            <a:schemeClr val="accent1"/>
-          </a:effectRef>
-          <a:fontRef idx="minor">
-            <a:schemeClr val="tx1"/>
-          </a:fontRef>
-        </p:style>
-      </p:cxnSp>
-      <p:sp>
-        <p:nvSpPr>
-          <p:cNvPr id="14" name="Rectangle 13">
+      </p:pic>
+      <p:sp>
+        <p:nvSpPr>
+          <p:cNvPr id="7" name="Subtitle 8">
             <a:extLst>
               <a:ext uri="{FF2B5EF4-FFF2-40B4-BE49-F238E27FC236}">
-                <a16:creationId xmlns:a16="http://schemas.microsoft.com/office/drawing/2014/main" id="{9D92459D-A39A-3D4D-8CBD-F700CF67E597}"/>
-              </a:ext>
-            </a:extLst>
-          </p:cNvPr>
-          <p:cNvSpPr/>
-          <p:nvPr/>
-        </p:nvSpPr>
-        <p:spPr>
-          <a:xfrm>
-            <a:off x="7009733" y="3882188"/>
-            <a:ext cx="743919" cy="666710"/>
-          </a:xfrm>
-          <a:prstGeom prst="rect">
-            <a:avLst/>
-          </a:prstGeom>
-          <a:solidFill>
-            <a:schemeClr val="accent6"/>
-          </a:solidFill>
-          <a:ln>
-            <a:solidFill>
-              <a:schemeClr val="accent6"/>
-            </a:solidFill>
-          </a:ln>
-        </p:spPr>
-        <p:style>
-          <a:lnRef idx="2">
-            <a:schemeClr val="accent1">
-              <a:shade val="50000"/>
-            </a:schemeClr>
-          </a:lnRef>
-          <a:fillRef idx="1">
-            <a:schemeClr val="accent1"/>
-          </a:fillRef>
-          <a:effectRef idx="0">
-            <a:schemeClr val="accent1"/>
-          </a:effectRef>
-          <a:fontRef idx="minor">
-            <a:schemeClr val="lt1"/>
-          </a:fontRef>
-        </p:style>
-        <p:txBody>
-          <a:bodyPr rtlCol="0" anchor="ctr"/>
-          <a:lstStyle/>
-          <a:p>
-            <a:pPr algn="ctr"/>
-            <a:r>
-              <a:rPr lang="en-US" dirty="0"/>
-              <a:t>“&gt;“ Key</a:t>
-            </a:r>
-          </a:p>
-        </p:txBody>
-      </p:sp>
-      <p:sp>
-        <p:nvSpPr>
-          <p:cNvPr id="15" name="Subtitle 8">
-            <a:extLst>
-              <a:ext uri="{FF2B5EF4-FFF2-40B4-BE49-F238E27FC236}">
-                <a16:creationId xmlns:a16="http://schemas.microsoft.com/office/drawing/2014/main" id="{0F714337-856E-4449-A4F3-F54575B354AA}"/>
+                <a16:creationId xmlns:a16="http://schemas.microsoft.com/office/drawing/2014/main" id="{5C270E37-0E22-6148-A1BA-04BA1036CA80}"/>
               </a:ext>
             </a:extLst>
           </p:cNvPr>
@@ -21425,11 +21583,37 @@
             </a:lvl9pPr>
           </a:lstStyle>
           <a:p>
-            <a:r>
-              <a:rPr lang="en-US" sz="1600" dirty="0">
-                <a:solidFill>
-                  <a:schemeClr val="tx1"/>
-                </a:solidFill>
+            <a:pPr marL="0" marR="0" lvl="0" indent="0" algn="ctr" defTabSz="914400" rtl="0" eaLnBrk="1" fontAlgn="auto" latinLnBrk="0" hangingPunct="1">
+              <a:lnSpc>
+                <a:spcPct val="100000"/>
+              </a:lnSpc>
+              <a:spcBef>
+                <a:spcPct val="20000"/>
+              </a:spcBef>
+              <a:spcAft>
+                <a:spcPts val="0"/>
+              </a:spcAft>
+              <a:buClrTx/>
+              <a:buSzTx/>
+              <a:buFont typeface="Arial" pitchFamily="34" charset="0"/>
+              <a:buNone/>
+              <a:tabLst/>
+              <a:defRPr/>
+            </a:pPr>
+            <a:r>
+              <a:rPr kumimoji="0" lang="en-US" sz="1600" b="0" i="0" u="none" strike="noStrike" kern="1200" cap="none" spc="0" normalizeH="0" baseline="0" noProof="0" dirty="0">
+                <a:ln>
+                  <a:noFill/>
+                </a:ln>
+                <a:solidFill>
+                  <a:prstClr val="white"/>
+                </a:solidFill>
+                <a:effectLst/>
+                <a:uLnTx/>
+                <a:uFillTx/>
+                <a:latin typeface="Calibri"/>
+                <a:ea typeface="+mn-ea"/>
+                <a:cs typeface="+mn-cs"/>
               </a:rPr>
               <a:t>LEFT</a:t>
             </a:r>
@@ -21438,10 +21622,10 @@
       </p:sp>
       <p:sp>
         <p:nvSpPr>
-          <p:cNvPr id="16" name="Right Arrow 15">
+          <p:cNvPr id="8" name="Right Arrow 7">
             <a:extLst>
               <a:ext uri="{FF2B5EF4-FFF2-40B4-BE49-F238E27FC236}">
-                <a16:creationId xmlns:a16="http://schemas.microsoft.com/office/drawing/2014/main" id="{EE94B0F1-EBDA-F244-A053-DBD743B03033}"/>
+                <a16:creationId xmlns:a16="http://schemas.microsoft.com/office/drawing/2014/main" id="{B0947CFA-28C1-1D40-ACC2-E94E571EE1F6}"/>
               </a:ext>
             </a:extLst>
           </p:cNvPr>
@@ -21481,15 +21665,44 @@
           <a:bodyPr rtlCol="0" anchor="ctr"/>
           <a:lstStyle/>
           <a:p>
-            <a:pPr algn="ctr"/>
-            <a:endParaRPr lang="en-US"/>
+            <a:pPr marL="0" marR="0" lvl="0" indent="0" algn="ctr" defTabSz="457200" rtl="0" eaLnBrk="1" fontAlgn="auto" latinLnBrk="0" hangingPunct="1">
+              <a:lnSpc>
+                <a:spcPct val="100000"/>
+              </a:lnSpc>
+              <a:spcBef>
+                <a:spcPts val="0"/>
+              </a:spcBef>
+              <a:spcAft>
+                <a:spcPts val="0"/>
+              </a:spcAft>
+              <a:buClrTx/>
+              <a:buSzTx/>
+              <a:buFontTx/>
+              <a:buNone/>
+              <a:tabLst/>
+              <a:defRPr/>
+            </a:pPr>
+            <a:endParaRPr kumimoji="0" lang="en-US" sz="1800" b="0" i="0" u="none" strike="noStrike" kern="1200" cap="none" spc="0" normalizeH="0" baseline="0" noProof="0">
+              <a:ln>
+                <a:noFill/>
+              </a:ln>
+              <a:solidFill>
+                <a:prstClr val="white"/>
+              </a:solidFill>
+              <a:effectLst/>
+              <a:uLnTx/>
+              <a:uFillTx/>
+              <a:latin typeface="Calibri"/>
+              <a:ea typeface="+mn-ea"/>
+              <a:cs typeface="+mn-cs"/>
+            </a:endParaRPr>
           </a:p>
         </p:txBody>
       </p:sp>
     </p:spTree>
     <p:extLst>
       <p:ext uri="{BB962C8B-B14F-4D97-AF65-F5344CB8AC3E}">
-        <p14:creationId xmlns:p14="http://schemas.microsoft.com/office/powerpoint/2010/main" val="758451698"/>
+        <p14:creationId xmlns:p14="http://schemas.microsoft.com/office/powerpoint/2010/main" val="1095126790"/>
       </p:ext>
     </p:extLst>
   </p:cSld>
@@ -21536,8 +21749,8 @@
         </p:nvSpPr>
         <p:spPr>
           <a:xfrm>
-            <a:off x="1111170" y="583724"/>
-            <a:ext cx="10591879" cy="5013227"/>
+            <a:off x="1794076" y="473172"/>
+            <a:ext cx="9051402" cy="1379691"/>
           </a:xfrm>
           <a:ln>
             <a:noFill/>
@@ -21554,43 +21767,19 @@
             </a:pPr>
             <a:r>
               <a:rPr lang="en-US" dirty="0"/>
-              <a:t>Before you start playing as the person choosing </a:t>
+              <a:t>So to be sure that everything makes sense let’s work through a few example </a:t>
             </a:r>
             <a:r>
               <a:rPr lang="en-US" dirty="0">
                 <a:solidFill>
-                  <a:srgbClr val="FFFF66"/>
+                  <a:srgbClr val="00FF00"/>
                 </a:solidFill>
               </a:rPr>
-              <a:t>posts</a:t>
+              <a:t>chatrooms</a:t>
             </a:r>
             <a:r>
               <a:rPr lang="en-US" dirty="0"/>
-              <a:t>, we'd also like you to help as a </a:t>
-            </a:r>
-            <a:r>
-              <a:rPr lang="en-US" dirty="0">
-                <a:solidFill>
-                  <a:srgbClr val="00FF00"/>
-                </a:solidFill>
-              </a:rPr>
-              <a:t>chatroom</a:t>
-            </a:r>
-            <a:r>
-              <a:rPr lang="en-US" dirty="0"/>
-              <a:t> member reading some other players' </a:t>
-            </a:r>
-            <a:r>
-              <a:rPr lang="en-US" dirty="0">
-                <a:solidFill>
-                  <a:srgbClr val="FFFF66"/>
-                </a:solidFill>
-              </a:rPr>
-              <a:t>posts</a:t>
-            </a:r>
-            <a:r>
-              <a:rPr lang="en-US" dirty="0"/>
-              <a:t>. </a:t>
+              <a:t>.</a:t>
             </a:r>
           </a:p>
           <a:p>
@@ -21603,13 +21792,7 @@
       </p:sp>
       <p:sp>
         <p:nvSpPr>
-          <p:cNvPr id="4" name="Title 3">
-            <a:extLst>
-              <a:ext uri="{FF2B5EF4-FFF2-40B4-BE49-F238E27FC236}">
-                <a16:creationId xmlns:a16="http://schemas.microsoft.com/office/drawing/2014/main" id="{3A04687C-A569-2C46-9FC2-ADCBBB048C8E}"/>
-              </a:ext>
-            </a:extLst>
-          </p:cNvPr>
+          <p:cNvPr id="26" name="Title 3"/>
           <p:cNvSpPr txBox="1">
             <a:spLocks/>
           </p:cNvSpPr>
@@ -21658,13 +21841,7 @@
       </p:sp>
       <p:sp>
         <p:nvSpPr>
-          <p:cNvPr id="5" name="Subtitle 8">
-            <a:extLst>
-              <a:ext uri="{FF2B5EF4-FFF2-40B4-BE49-F238E27FC236}">
-                <a16:creationId xmlns:a16="http://schemas.microsoft.com/office/drawing/2014/main" id="{5385BA60-94EE-1D48-A0DD-23171E6645FB}"/>
-              </a:ext>
-            </a:extLst>
-          </p:cNvPr>
+          <p:cNvPr id="12" name="Subtitle 8"/>
           <p:cNvSpPr txBox="1">
             <a:spLocks/>
           </p:cNvSpPr>
@@ -21852,13 +22029,7 @@
       </p:sp>
       <p:sp>
         <p:nvSpPr>
-          <p:cNvPr id="6" name="Right Arrow 5">
-            <a:extLst>
-              <a:ext uri="{FF2B5EF4-FFF2-40B4-BE49-F238E27FC236}">
-                <a16:creationId xmlns:a16="http://schemas.microsoft.com/office/drawing/2014/main" id="{E505ED16-B2E8-4140-B53D-56027D0A90C5}"/>
-              </a:ext>
-            </a:extLst>
-          </p:cNvPr>
+          <p:cNvPr id="13" name="Right Arrow 12"/>
           <p:cNvSpPr/>
           <p:nvPr/>
         </p:nvSpPr>
@@ -21900,12 +22071,240 @@
           </a:p>
         </p:txBody>
       </p:sp>
-      <p:sp>
-        <p:nvSpPr>
-          <p:cNvPr id="7" name="Subtitle 8">
+      <p:pic>
+        <p:nvPicPr>
+          <p:cNvPr id="8" name="Picture 7" descr="Graphical user interface&#10;&#10;Description automatically generated">
             <a:extLst>
               <a:ext uri="{FF2B5EF4-FFF2-40B4-BE49-F238E27FC236}">
-                <a16:creationId xmlns:a16="http://schemas.microsoft.com/office/drawing/2014/main" id="{E6F82A75-E88D-9449-99A1-10A143D7EA42}"/>
+                <a16:creationId xmlns:a16="http://schemas.microsoft.com/office/drawing/2014/main" id="{A77AD95F-E386-C04B-B4F1-084B641B1C88}"/>
+              </a:ext>
+            </a:extLst>
+          </p:cNvPr>
+          <p:cNvPicPr>
+            <a:picLocks noChangeAspect="1"/>
+          </p:cNvPicPr>
+          <p:nvPr/>
+        </p:nvPicPr>
+        <p:blipFill rotWithShape="1">
+          <a:blip r:embed="rId3"/>
+          <a:srcRect t="36427"/>
+          <a:stretch/>
+        </p:blipFill>
+        <p:spPr>
+          <a:xfrm>
+            <a:off x="3062508" y="2550695"/>
+            <a:ext cx="5626100" cy="904258"/>
+          </a:xfrm>
+          <a:prstGeom prst="rect">
+            <a:avLst/>
+          </a:prstGeom>
+        </p:spPr>
+      </p:pic>
+      <p:cxnSp>
+        <p:nvCxnSpPr>
+          <p:cNvPr id="9" name="Straight Arrow Connector 8">
+            <a:extLst>
+              <a:ext uri="{FF2B5EF4-FFF2-40B4-BE49-F238E27FC236}">
+                <a16:creationId xmlns:a16="http://schemas.microsoft.com/office/drawing/2014/main" id="{5B1CA22A-CD91-E940-BE65-2E10126871FE}"/>
+              </a:ext>
+            </a:extLst>
+          </p:cNvPr>
+          <p:cNvCxnSpPr>
+            <a:cxnSpLocks/>
+            <a:stCxn id="10" idx="0"/>
+          </p:cNvCxnSpPr>
+          <p:nvPr/>
+        </p:nvCxnSpPr>
+        <p:spPr>
+          <a:xfrm flipV="1">
+            <a:off x="4119084" y="3454953"/>
+            <a:ext cx="0" cy="477541"/>
+          </a:xfrm>
+          <a:prstGeom prst="straightConnector1">
+            <a:avLst/>
+          </a:prstGeom>
+          <a:ln>
+            <a:tailEnd type="triangle"/>
+          </a:ln>
+        </p:spPr>
+        <p:style>
+          <a:lnRef idx="1">
+            <a:schemeClr val="accent1"/>
+          </a:lnRef>
+          <a:fillRef idx="0">
+            <a:schemeClr val="accent1"/>
+          </a:fillRef>
+          <a:effectRef idx="0">
+            <a:schemeClr val="accent1"/>
+          </a:effectRef>
+          <a:fontRef idx="minor">
+            <a:schemeClr val="tx1"/>
+          </a:fontRef>
+        </p:style>
+      </p:cxnSp>
+      <p:sp>
+        <p:nvSpPr>
+          <p:cNvPr id="10" name="Rectangle 9">
+            <a:extLst>
+              <a:ext uri="{FF2B5EF4-FFF2-40B4-BE49-F238E27FC236}">
+                <a16:creationId xmlns:a16="http://schemas.microsoft.com/office/drawing/2014/main" id="{CA3AF63F-0AF3-B94B-B308-4DFAD06FE454}"/>
+              </a:ext>
+            </a:extLst>
+          </p:cNvPr>
+          <p:cNvSpPr/>
+          <p:nvPr/>
+        </p:nvSpPr>
+        <p:spPr>
+          <a:xfrm>
+            <a:off x="3747124" y="3932494"/>
+            <a:ext cx="743919" cy="666710"/>
+          </a:xfrm>
+          <a:prstGeom prst="rect">
+            <a:avLst/>
+          </a:prstGeom>
+          <a:solidFill>
+            <a:schemeClr val="accent1"/>
+          </a:solidFill>
+          <a:ln>
+            <a:noFill/>
+          </a:ln>
+        </p:spPr>
+        <p:style>
+          <a:lnRef idx="2">
+            <a:schemeClr val="accent1">
+              <a:shade val="50000"/>
+            </a:schemeClr>
+          </a:lnRef>
+          <a:fillRef idx="1">
+            <a:schemeClr val="accent1"/>
+          </a:fillRef>
+          <a:effectRef idx="0">
+            <a:schemeClr val="accent1"/>
+          </a:effectRef>
+          <a:fontRef idx="minor">
+            <a:schemeClr val="lt1"/>
+          </a:fontRef>
+        </p:style>
+        <p:txBody>
+          <a:bodyPr rtlCol="0" anchor="ctr"/>
+          <a:lstStyle/>
+          <a:p>
+            <a:pPr algn="ctr"/>
+            <a:r>
+              <a:rPr lang="en-US" dirty="0"/>
+              <a:t>“&lt;“ Key</a:t>
+            </a:r>
+          </a:p>
+        </p:txBody>
+      </p:sp>
+      <p:cxnSp>
+        <p:nvCxnSpPr>
+          <p:cNvPr id="11" name="Straight Arrow Connector 10">
+            <a:extLst>
+              <a:ext uri="{FF2B5EF4-FFF2-40B4-BE49-F238E27FC236}">
+                <a16:creationId xmlns:a16="http://schemas.microsoft.com/office/drawing/2014/main" id="{E363D8C6-6470-804D-B1C3-71BF6E1F4D7A}"/>
+              </a:ext>
+            </a:extLst>
+          </p:cNvPr>
+          <p:cNvCxnSpPr>
+            <a:cxnSpLocks/>
+            <a:stCxn id="14" idx="0"/>
+          </p:cNvCxnSpPr>
+          <p:nvPr/>
+        </p:nvCxnSpPr>
+        <p:spPr>
+          <a:xfrm flipV="1">
+            <a:off x="7381693" y="3404647"/>
+            <a:ext cx="0" cy="477541"/>
+          </a:xfrm>
+          <a:prstGeom prst="straightConnector1">
+            <a:avLst/>
+          </a:prstGeom>
+          <a:ln>
+            <a:solidFill>
+              <a:schemeClr val="accent6"/>
+            </a:solidFill>
+            <a:tailEnd type="triangle"/>
+          </a:ln>
+        </p:spPr>
+        <p:style>
+          <a:lnRef idx="1">
+            <a:schemeClr val="accent1"/>
+          </a:lnRef>
+          <a:fillRef idx="0">
+            <a:schemeClr val="accent1"/>
+          </a:fillRef>
+          <a:effectRef idx="0">
+            <a:schemeClr val="accent1"/>
+          </a:effectRef>
+          <a:fontRef idx="minor">
+            <a:schemeClr val="tx1"/>
+          </a:fontRef>
+        </p:style>
+      </p:cxnSp>
+      <p:sp>
+        <p:nvSpPr>
+          <p:cNvPr id="14" name="Rectangle 13">
+            <a:extLst>
+              <a:ext uri="{FF2B5EF4-FFF2-40B4-BE49-F238E27FC236}">
+                <a16:creationId xmlns:a16="http://schemas.microsoft.com/office/drawing/2014/main" id="{9D92459D-A39A-3D4D-8CBD-F700CF67E597}"/>
+              </a:ext>
+            </a:extLst>
+          </p:cNvPr>
+          <p:cNvSpPr/>
+          <p:nvPr/>
+        </p:nvSpPr>
+        <p:spPr>
+          <a:xfrm>
+            <a:off x="7009733" y="3882188"/>
+            <a:ext cx="743919" cy="666710"/>
+          </a:xfrm>
+          <a:prstGeom prst="rect">
+            <a:avLst/>
+          </a:prstGeom>
+          <a:solidFill>
+            <a:schemeClr val="accent6"/>
+          </a:solidFill>
+          <a:ln>
+            <a:solidFill>
+              <a:schemeClr val="accent6"/>
+            </a:solidFill>
+          </a:ln>
+        </p:spPr>
+        <p:style>
+          <a:lnRef idx="2">
+            <a:schemeClr val="accent1">
+              <a:shade val="50000"/>
+            </a:schemeClr>
+          </a:lnRef>
+          <a:fillRef idx="1">
+            <a:schemeClr val="accent1"/>
+          </a:fillRef>
+          <a:effectRef idx="0">
+            <a:schemeClr val="accent1"/>
+          </a:effectRef>
+          <a:fontRef idx="minor">
+            <a:schemeClr val="lt1"/>
+          </a:fontRef>
+        </p:style>
+        <p:txBody>
+          <a:bodyPr rtlCol="0" anchor="ctr"/>
+          <a:lstStyle/>
+          <a:p>
+            <a:pPr algn="ctr"/>
+            <a:r>
+              <a:rPr lang="en-US" dirty="0"/>
+              <a:t>“&gt;“ Key</a:t>
+            </a:r>
+          </a:p>
+        </p:txBody>
+      </p:sp>
+      <p:sp>
+        <p:nvSpPr>
+          <p:cNvPr id="15" name="Subtitle 8">
+            <a:extLst>
+              <a:ext uri="{FF2B5EF4-FFF2-40B4-BE49-F238E27FC236}">
+                <a16:creationId xmlns:a16="http://schemas.microsoft.com/office/drawing/2014/main" id="{0F714337-856E-4449-A4F3-F54575B354AA}"/>
               </a:ext>
             </a:extLst>
           </p:cNvPr>
@@ -22096,10 +22495,10 @@
       </p:sp>
       <p:sp>
         <p:nvSpPr>
-          <p:cNvPr id="8" name="Right Arrow 7">
+          <p:cNvPr id="16" name="Right Arrow 15">
             <a:extLst>
               <a:ext uri="{FF2B5EF4-FFF2-40B4-BE49-F238E27FC236}">
-                <a16:creationId xmlns:a16="http://schemas.microsoft.com/office/drawing/2014/main" id="{427030FA-99E1-0845-A3B8-346EE1357636}"/>
+                <a16:creationId xmlns:a16="http://schemas.microsoft.com/office/drawing/2014/main" id="{EE94B0F1-EBDA-F244-A053-DBD743B03033}"/>
               </a:ext>
             </a:extLst>
           </p:cNvPr>
@@ -22144,44 +22543,10 @@
           </a:p>
         </p:txBody>
       </p:sp>
-      <p:pic>
-        <p:nvPicPr>
-          <p:cNvPr id="9" name="Picture 8" descr="A screenshot of a computer&#10;&#10;Description automatically generated with medium confidence">
-            <a:extLst>
-              <a:ext uri="{FF2B5EF4-FFF2-40B4-BE49-F238E27FC236}">
-                <a16:creationId xmlns:a16="http://schemas.microsoft.com/office/drawing/2014/main" id="{DEA315B9-3AE8-544C-BB4B-3F1CB88493DC}"/>
-              </a:ext>
-            </a:extLst>
-          </p:cNvPr>
-          <p:cNvPicPr>
-            <a:picLocks noChangeAspect="1"/>
-          </p:cNvPicPr>
-          <p:nvPr/>
-        </p:nvPicPr>
-        <p:blipFill rotWithShape="1">
-          <a:blip r:embed="rId3"/>
-          <a:srcRect l="4700" t="13549" r="4278" b="6797"/>
-          <a:stretch/>
-        </p:blipFill>
-        <p:spPr>
-          <a:xfrm>
-            <a:off x="3628103" y="2264577"/>
-            <a:ext cx="4935794" cy="3634546"/>
-          </a:xfrm>
-          <a:prstGeom prst="rect">
-            <a:avLst/>
-          </a:prstGeom>
-          <a:ln>
-            <a:solidFill>
-              <a:schemeClr val="tx1"/>
-            </a:solidFill>
-          </a:ln>
-        </p:spPr>
-      </p:pic>
     </p:spTree>
     <p:extLst>
       <p:ext uri="{BB962C8B-B14F-4D97-AF65-F5344CB8AC3E}">
-        <p14:creationId xmlns:p14="http://schemas.microsoft.com/office/powerpoint/2010/main" val="3655759105"/>
+        <p14:creationId xmlns:p14="http://schemas.microsoft.com/office/powerpoint/2010/main" val="758451698"/>
       </p:ext>
     </p:extLst>
   </p:cSld>
@@ -22246,7 +22611,7 @@
             </a:pPr>
             <a:r>
               <a:rPr lang="en-US" dirty="0"/>
-              <a:t>For each </a:t>
+              <a:t>Before you start playing as the person choosing </a:t>
             </a:r>
             <a:r>
               <a:rPr lang="en-US" dirty="0">
@@ -22254,61 +22619,35 @@
                   <a:srgbClr val="FFFF66"/>
                 </a:solidFill>
               </a:rPr>
-              <a:t>post</a:t>
+              <a:t>posts</a:t>
             </a:r>
             <a:r>
               <a:rPr lang="en-US" dirty="0"/>
-              <a:t> you see:</a:t>
-            </a:r>
-          </a:p>
-          <a:p>
-            <a:pPr marL="0" indent="0">
-              <a:buNone/>
-            </a:pPr>
+              <a:t>, we'd also like you to help as a </a:t>
+            </a:r>
+            <a:r>
+              <a:rPr lang="en-US" dirty="0">
+                <a:solidFill>
+                  <a:srgbClr val="00FF00"/>
+                </a:solidFill>
+              </a:rPr>
+              <a:t>chatroom</a:t>
+            </a:r>
             <a:r>
               <a:rPr lang="en-US" dirty="0"/>
-              <a:t>Press the ‘&gt;’ KEY to </a:t>
-            </a:r>
-            <a:r>
-              <a:rPr lang="en-US" b="1" dirty="0"/>
-              <a:t>ADD</a:t>
+              <a:t> member reading some other players' </a:t>
+            </a:r>
+            <a:r>
+              <a:rPr lang="en-US" dirty="0">
+                <a:solidFill>
+                  <a:srgbClr val="FFFF66"/>
+                </a:solidFill>
+              </a:rPr>
+              <a:t>posts</a:t>
             </a:r>
             <a:r>
               <a:rPr lang="en-US" dirty="0"/>
-              <a:t> a </a:t>
-            </a:r>
-            <a:r>
-              <a:rPr lang="en-US" dirty="0">
-                <a:solidFill>
-                  <a:srgbClr val="00FDFF"/>
-                </a:solidFill>
-              </a:rPr>
-              <a:t>like</a:t>
-            </a:r>
-            <a:r>
-              <a:rPr lang="en-US" dirty="0"/>
-              <a:t>.</a:t>
-            </a:r>
-          </a:p>
-          <a:p>
-            <a:pPr marL="0" indent="0">
-              <a:buNone/>
-            </a:pPr>
-            <a:r>
-              <a:rPr lang="en-US" dirty="0"/>
-              <a:t>Press the ‘&lt;‘ KEY if you don’t want to add a </a:t>
-            </a:r>
-            <a:r>
-              <a:rPr lang="en-US" dirty="0">
-                <a:solidFill>
-                  <a:srgbClr val="00FDFF"/>
-                </a:solidFill>
-              </a:rPr>
-              <a:t>like</a:t>
-            </a:r>
-            <a:r>
-              <a:rPr lang="en-US" dirty="0"/>
-              <a:t>.</a:t>
+              <a:t>. </a:t>
             </a:r>
           </a:p>
           <a:p>
@@ -22618,256 +22957,12 @@
           </a:p>
         </p:txBody>
       </p:sp>
-      <p:sp>
-        <p:nvSpPr>
-          <p:cNvPr id="7" name="Subtitle 8">
-            <a:extLst>
-              <a:ext uri="{FF2B5EF4-FFF2-40B4-BE49-F238E27FC236}">
-                <a16:creationId xmlns:a16="http://schemas.microsoft.com/office/drawing/2014/main" id="{4BDF4734-B63C-DF44-8671-1E43AFCD02DC}"/>
-              </a:ext>
-            </a:extLst>
-          </p:cNvPr>
-          <p:cNvSpPr txBox="1">
-            <a:spLocks/>
-          </p:cNvSpPr>
-          <p:nvPr/>
-        </p:nvSpPr>
-        <p:spPr>
-          <a:xfrm>
-            <a:off x="1518826" y="6073844"/>
-            <a:ext cx="1532830" cy="801636"/>
-          </a:xfrm>
-          <a:prstGeom prst="rect">
-            <a:avLst/>
-          </a:prstGeom>
-        </p:spPr>
-        <p:txBody>
-          <a:bodyPr vert="horz" lIns="91440" tIns="45720" rIns="91440" bIns="45720" rtlCol="0">
-            <a:normAutofit/>
-          </a:bodyPr>
-          <a:lstStyle>
-            <a:lvl1pPr marL="0" indent="0" algn="ctr" defTabSz="914400" rtl="0" eaLnBrk="1" latinLnBrk="0" hangingPunct="1">
-              <a:spcBef>
-                <a:spcPct val="20000"/>
-              </a:spcBef>
-              <a:buFont typeface="Arial" pitchFamily="34" charset="0"/>
-              <a:buNone/>
-              <a:defRPr sz="3200" kern="1200">
-                <a:solidFill>
-                  <a:schemeClr val="tx1">
-                    <a:tint val="75000"/>
-                  </a:schemeClr>
-                </a:solidFill>
-                <a:latin typeface="+mn-lt"/>
-                <a:ea typeface="+mn-ea"/>
-                <a:cs typeface="+mn-cs"/>
-              </a:defRPr>
-            </a:lvl1pPr>
-            <a:lvl2pPr marL="457200" indent="0" algn="ctr" defTabSz="914400" rtl="0" eaLnBrk="1" latinLnBrk="0" hangingPunct="1">
-              <a:spcBef>
-                <a:spcPct val="20000"/>
-              </a:spcBef>
-              <a:buFont typeface="Arial" pitchFamily="34" charset="0"/>
-              <a:buNone/>
-              <a:defRPr sz="2800" kern="1200">
-                <a:solidFill>
-                  <a:schemeClr val="tx1">
-                    <a:tint val="75000"/>
-                  </a:schemeClr>
-                </a:solidFill>
-                <a:latin typeface="+mn-lt"/>
-                <a:ea typeface="+mn-ea"/>
-                <a:cs typeface="+mn-cs"/>
-              </a:defRPr>
-            </a:lvl2pPr>
-            <a:lvl3pPr marL="914400" indent="0" algn="ctr" defTabSz="914400" rtl="0" eaLnBrk="1" latinLnBrk="0" hangingPunct="1">
-              <a:spcBef>
-                <a:spcPct val="20000"/>
-              </a:spcBef>
-              <a:buFont typeface="Arial" pitchFamily="34" charset="0"/>
-              <a:buNone/>
-              <a:defRPr sz="2400" kern="1200">
-                <a:solidFill>
-                  <a:schemeClr val="tx1">
-                    <a:tint val="75000"/>
-                  </a:schemeClr>
-                </a:solidFill>
-                <a:latin typeface="+mn-lt"/>
-                <a:ea typeface="+mn-ea"/>
-                <a:cs typeface="+mn-cs"/>
-              </a:defRPr>
-            </a:lvl3pPr>
-            <a:lvl4pPr marL="1371600" indent="0" algn="ctr" defTabSz="914400" rtl="0" eaLnBrk="1" latinLnBrk="0" hangingPunct="1">
-              <a:spcBef>
-                <a:spcPct val="20000"/>
-              </a:spcBef>
-              <a:buFont typeface="Arial" pitchFamily="34" charset="0"/>
-              <a:buNone/>
-              <a:defRPr sz="2000" kern="1200">
-                <a:solidFill>
-                  <a:schemeClr val="tx1">
-                    <a:tint val="75000"/>
-                  </a:schemeClr>
-                </a:solidFill>
-                <a:latin typeface="+mn-lt"/>
-                <a:ea typeface="+mn-ea"/>
-                <a:cs typeface="+mn-cs"/>
-              </a:defRPr>
-            </a:lvl4pPr>
-            <a:lvl5pPr marL="1828800" indent="0" algn="ctr" defTabSz="914400" rtl="0" eaLnBrk="1" latinLnBrk="0" hangingPunct="1">
-              <a:spcBef>
-                <a:spcPct val="20000"/>
-              </a:spcBef>
-              <a:buFont typeface="Arial" pitchFamily="34" charset="0"/>
-              <a:buNone/>
-              <a:defRPr sz="2000" kern="1200">
-                <a:solidFill>
-                  <a:schemeClr val="tx1">
-                    <a:tint val="75000"/>
-                  </a:schemeClr>
-                </a:solidFill>
-                <a:latin typeface="+mn-lt"/>
-                <a:ea typeface="+mn-ea"/>
-                <a:cs typeface="+mn-cs"/>
-              </a:defRPr>
-            </a:lvl5pPr>
-            <a:lvl6pPr marL="2286000" indent="0" algn="ctr" defTabSz="914400" rtl="0" eaLnBrk="1" latinLnBrk="0" hangingPunct="1">
-              <a:spcBef>
-                <a:spcPct val="20000"/>
-              </a:spcBef>
-              <a:buFont typeface="Arial" pitchFamily="34" charset="0"/>
-              <a:buNone/>
-              <a:defRPr sz="2000" kern="1200">
-                <a:solidFill>
-                  <a:schemeClr val="tx1">
-                    <a:tint val="75000"/>
-                  </a:schemeClr>
-                </a:solidFill>
-                <a:latin typeface="+mn-lt"/>
-                <a:ea typeface="+mn-ea"/>
-                <a:cs typeface="+mn-cs"/>
-              </a:defRPr>
-            </a:lvl6pPr>
-            <a:lvl7pPr marL="2743200" indent="0" algn="ctr" defTabSz="914400" rtl="0" eaLnBrk="1" latinLnBrk="0" hangingPunct="1">
-              <a:spcBef>
-                <a:spcPct val="20000"/>
-              </a:spcBef>
-              <a:buFont typeface="Arial" pitchFamily="34" charset="0"/>
-              <a:buNone/>
-              <a:defRPr sz="2000" kern="1200">
-                <a:solidFill>
-                  <a:schemeClr val="tx1">
-                    <a:tint val="75000"/>
-                  </a:schemeClr>
-                </a:solidFill>
-                <a:latin typeface="+mn-lt"/>
-                <a:ea typeface="+mn-ea"/>
-                <a:cs typeface="+mn-cs"/>
-              </a:defRPr>
-            </a:lvl7pPr>
-            <a:lvl8pPr marL="3200400" indent="0" algn="ctr" defTabSz="914400" rtl="0" eaLnBrk="1" latinLnBrk="0" hangingPunct="1">
-              <a:spcBef>
-                <a:spcPct val="20000"/>
-              </a:spcBef>
-              <a:buFont typeface="Arial" pitchFamily="34" charset="0"/>
-              <a:buNone/>
-              <a:defRPr sz="2000" kern="1200">
-                <a:solidFill>
-                  <a:schemeClr val="tx1">
-                    <a:tint val="75000"/>
-                  </a:schemeClr>
-                </a:solidFill>
-                <a:latin typeface="+mn-lt"/>
-                <a:ea typeface="+mn-ea"/>
-                <a:cs typeface="+mn-cs"/>
-              </a:defRPr>
-            </a:lvl8pPr>
-            <a:lvl9pPr marL="3657600" indent="0" algn="ctr" defTabSz="914400" rtl="0" eaLnBrk="1" latinLnBrk="0" hangingPunct="1">
-              <a:spcBef>
-                <a:spcPct val="20000"/>
-              </a:spcBef>
-              <a:buFont typeface="Arial" pitchFamily="34" charset="0"/>
-              <a:buNone/>
-              <a:defRPr sz="2000" kern="1200">
-                <a:solidFill>
-                  <a:schemeClr val="tx1">
-                    <a:tint val="75000"/>
-                  </a:schemeClr>
-                </a:solidFill>
-                <a:latin typeface="+mn-lt"/>
-                <a:ea typeface="+mn-ea"/>
-                <a:cs typeface="+mn-cs"/>
-              </a:defRPr>
-            </a:lvl9pPr>
-          </a:lstStyle>
-          <a:p>
-            <a:r>
-              <a:rPr lang="en-US" sz="1600" dirty="0">
-                <a:solidFill>
-                  <a:schemeClr val="tx1"/>
-                </a:solidFill>
-              </a:rPr>
-              <a:t>LEFT</a:t>
-            </a:r>
-          </a:p>
-        </p:txBody>
-      </p:sp>
-      <p:sp>
-        <p:nvSpPr>
-          <p:cNvPr id="8" name="Right Arrow 7">
-            <a:extLst>
-              <a:ext uri="{FF2B5EF4-FFF2-40B4-BE49-F238E27FC236}">
-                <a16:creationId xmlns:a16="http://schemas.microsoft.com/office/drawing/2014/main" id="{8E22DF06-D6BE-AB44-B261-74815089D5A0}"/>
-              </a:ext>
-            </a:extLst>
-          </p:cNvPr>
-          <p:cNvSpPr/>
-          <p:nvPr/>
-        </p:nvSpPr>
-        <p:spPr>
-          <a:xfrm rot="10800000">
-            <a:off x="1902125" y="6391827"/>
-            <a:ext cx="640200" cy="289763"/>
-          </a:xfrm>
-          <a:prstGeom prst="rightArrow">
-            <a:avLst/>
-          </a:prstGeom>
-          <a:solidFill>
-            <a:schemeClr val="tx1"/>
-          </a:solidFill>
-          <a:ln>
-            <a:noFill/>
-          </a:ln>
-        </p:spPr>
-        <p:style>
-          <a:lnRef idx="1">
-            <a:schemeClr val="accent1"/>
-          </a:lnRef>
-          <a:fillRef idx="3">
-            <a:schemeClr val="accent1"/>
-          </a:fillRef>
-          <a:effectRef idx="2">
-            <a:schemeClr val="accent1"/>
-          </a:effectRef>
-          <a:fontRef idx="minor">
-            <a:schemeClr val="lt1"/>
-          </a:fontRef>
-        </p:style>
-        <p:txBody>
-          <a:bodyPr rtlCol="0" anchor="ctr"/>
-          <a:lstStyle/>
-          <a:p>
-            <a:pPr algn="ctr"/>
-            <a:endParaRPr lang="en-US"/>
-          </a:p>
-        </p:txBody>
-      </p:sp>
       <p:pic>
         <p:nvPicPr>
           <p:cNvPr id="9" name="Picture 8" descr="A screenshot of a computer&#10;&#10;Description automatically generated with medium confidence">
             <a:extLst>
               <a:ext uri="{FF2B5EF4-FFF2-40B4-BE49-F238E27FC236}">
-                <a16:creationId xmlns:a16="http://schemas.microsoft.com/office/drawing/2014/main" id="{39AECFE0-4DE0-A642-B84B-622F5F7928C9}"/>
+                <a16:creationId xmlns:a16="http://schemas.microsoft.com/office/drawing/2014/main" id="{DEA315B9-3AE8-544C-BB4B-3F1CB88493DC}"/>
               </a:ext>
             </a:extLst>
           </p:cNvPr>
@@ -22878,13 +22973,13 @@
         </p:nvPicPr>
         <p:blipFill rotWithShape="1">
           <a:blip r:embed="rId3"/>
-          <a:srcRect l="28990" t="25136" r="16970" b="67881"/>
+          <a:srcRect l="4700" t="13549" r="4278" b="6797"/>
           <a:stretch/>
         </p:blipFill>
         <p:spPr>
           <a:xfrm>
-            <a:off x="2542325" y="2690287"/>
-            <a:ext cx="6908866" cy="751241"/>
+            <a:off x="3628103" y="2264577"/>
+            <a:ext cx="4935794" cy="3634546"/>
           </a:xfrm>
           <a:prstGeom prst="rect">
             <a:avLst/>
@@ -22896,44 +22991,10 @@
           </a:ln>
         </p:spPr>
       </p:pic>
-      <p:pic>
-        <p:nvPicPr>
-          <p:cNvPr id="11" name="Picture 10" descr="A screenshot of a computer&#10;&#10;Description automatically generated with medium confidence">
-            <a:extLst>
-              <a:ext uri="{FF2B5EF4-FFF2-40B4-BE49-F238E27FC236}">
-                <a16:creationId xmlns:a16="http://schemas.microsoft.com/office/drawing/2014/main" id="{D1E110C0-4239-7A4B-930B-CD80117D2CF9}"/>
-              </a:ext>
-            </a:extLst>
-          </p:cNvPr>
-          <p:cNvPicPr>
-            <a:picLocks noChangeAspect="1"/>
-          </p:cNvPicPr>
-          <p:nvPr/>
-        </p:nvPicPr>
-        <p:blipFill rotWithShape="1">
-          <a:blip r:embed="rId4"/>
-          <a:srcRect l="28635" t="31963" r="16724" b="61066"/>
-          <a:stretch/>
-        </p:blipFill>
-        <p:spPr>
-          <a:xfrm>
-            <a:off x="2542325" y="3459670"/>
-            <a:ext cx="6908866" cy="741751"/>
-          </a:xfrm>
-          <a:prstGeom prst="rect">
-            <a:avLst/>
-          </a:prstGeom>
-          <a:ln>
-            <a:solidFill>
-              <a:schemeClr val="tx1"/>
-            </a:solidFill>
-          </a:ln>
-        </p:spPr>
-      </p:pic>
     </p:spTree>
     <p:extLst>
       <p:ext uri="{BB962C8B-B14F-4D97-AF65-F5344CB8AC3E}">
-        <p14:creationId xmlns:p14="http://schemas.microsoft.com/office/powerpoint/2010/main" val="3066544549"/>
+        <p14:creationId xmlns:p14="http://schemas.microsoft.com/office/powerpoint/2010/main" val="3655759105"/>
       </p:ext>
     </p:extLst>
   </p:cSld>
@@ -23676,6 +23737,758 @@
         </p:nvSpPr>
         <p:spPr>
           <a:xfrm>
+            <a:off x="1111170" y="583724"/>
+            <a:ext cx="10591879" cy="5013227"/>
+          </a:xfrm>
+          <a:ln>
+            <a:noFill/>
+          </a:ln>
+        </p:spPr>
+        <p:txBody>
+          <a:bodyPr>
+            <a:noAutofit/>
+          </a:bodyPr>
+          <a:lstStyle/>
+          <a:p>
+            <a:pPr marL="0" indent="0">
+              <a:buNone/>
+            </a:pPr>
+            <a:r>
+              <a:rPr lang="en-US" dirty="0"/>
+              <a:t>For each </a:t>
+            </a:r>
+            <a:r>
+              <a:rPr lang="en-US" dirty="0">
+                <a:solidFill>
+                  <a:srgbClr val="FFFF66"/>
+                </a:solidFill>
+              </a:rPr>
+              <a:t>post</a:t>
+            </a:r>
+            <a:r>
+              <a:rPr lang="en-US" dirty="0"/>
+              <a:t> you see:</a:t>
+            </a:r>
+          </a:p>
+          <a:p>
+            <a:pPr marL="0" indent="0">
+              <a:buNone/>
+            </a:pPr>
+            <a:r>
+              <a:rPr lang="en-US" dirty="0"/>
+              <a:t>Press the ‘&gt;’ KEY to </a:t>
+            </a:r>
+            <a:r>
+              <a:rPr lang="en-US" b="1" dirty="0"/>
+              <a:t>ADD</a:t>
+            </a:r>
+            <a:r>
+              <a:rPr lang="en-US" dirty="0"/>
+              <a:t> a </a:t>
+            </a:r>
+            <a:r>
+              <a:rPr lang="en-US" dirty="0">
+                <a:solidFill>
+                  <a:srgbClr val="00FDFF"/>
+                </a:solidFill>
+              </a:rPr>
+              <a:t>like</a:t>
+            </a:r>
+            <a:r>
+              <a:rPr lang="en-US" dirty="0"/>
+              <a:t>.</a:t>
+            </a:r>
+          </a:p>
+          <a:p>
+            <a:pPr marL="0" indent="0">
+              <a:buNone/>
+            </a:pPr>
+            <a:r>
+              <a:rPr lang="en-US" dirty="0"/>
+              <a:t>Press the ‘&lt;‘ KEY if you don’t want to add a </a:t>
+            </a:r>
+            <a:r>
+              <a:rPr lang="en-US" dirty="0">
+                <a:solidFill>
+                  <a:srgbClr val="00FDFF"/>
+                </a:solidFill>
+              </a:rPr>
+              <a:t>like</a:t>
+            </a:r>
+            <a:r>
+              <a:rPr lang="en-US" dirty="0"/>
+              <a:t>.</a:t>
+            </a:r>
+          </a:p>
+          <a:p>
+            <a:pPr marL="0" indent="0">
+              <a:buNone/>
+            </a:pPr>
+            <a:endParaRPr lang="en-US" dirty="0"/>
+          </a:p>
+        </p:txBody>
+      </p:sp>
+      <p:sp>
+        <p:nvSpPr>
+          <p:cNvPr id="4" name="Title 3">
+            <a:extLst>
+              <a:ext uri="{FF2B5EF4-FFF2-40B4-BE49-F238E27FC236}">
+                <a16:creationId xmlns:a16="http://schemas.microsoft.com/office/drawing/2014/main" id="{3A04687C-A569-2C46-9FC2-ADCBBB048C8E}"/>
+              </a:ext>
+            </a:extLst>
+          </p:cNvPr>
+          <p:cNvSpPr txBox="1">
+            <a:spLocks/>
+          </p:cNvSpPr>
+          <p:nvPr/>
+        </p:nvSpPr>
+        <p:spPr>
+          <a:xfrm>
+            <a:off x="1524000" y="6201295"/>
+            <a:ext cx="9149174" cy="656705"/>
+          </a:xfrm>
+          <a:prstGeom prst="rect">
+            <a:avLst/>
+          </a:prstGeom>
+        </p:spPr>
+        <p:txBody>
+          <a:bodyPr vert="horz" lIns="91440" tIns="45720" rIns="91440" bIns="45720" rtlCol="0" anchor="ctr">
+            <a:normAutofit/>
+          </a:bodyPr>
+          <a:lstStyle>
+            <a:lvl1pPr algn="ctr" defTabSz="914400" rtl="0" eaLnBrk="1" latinLnBrk="0" hangingPunct="1">
+              <a:spcBef>
+                <a:spcPct val="0"/>
+              </a:spcBef>
+              <a:buNone/>
+              <a:defRPr sz="4400" kern="1200">
+                <a:solidFill>
+                  <a:schemeClr val="tx1"/>
+                </a:solidFill>
+                <a:latin typeface="+mj-lt"/>
+                <a:ea typeface="+mj-ea"/>
+                <a:cs typeface="+mj-cs"/>
+              </a:defRPr>
+            </a:lvl1pPr>
+          </a:lstStyle>
+          <a:p>
+            <a:r>
+              <a:rPr lang="en-US" sz="3000" dirty="0">
+                <a:solidFill>
+                  <a:srgbClr val="FF0000"/>
+                </a:solidFill>
+              </a:rPr>
+              <a:t>PRESS THE RIGHT BUTTON TO CONTINUE</a:t>
+            </a:r>
+          </a:p>
+        </p:txBody>
+      </p:sp>
+      <p:sp>
+        <p:nvSpPr>
+          <p:cNvPr id="5" name="Subtitle 8">
+            <a:extLst>
+              <a:ext uri="{FF2B5EF4-FFF2-40B4-BE49-F238E27FC236}">
+                <a16:creationId xmlns:a16="http://schemas.microsoft.com/office/drawing/2014/main" id="{5385BA60-94EE-1D48-A0DD-23171E6645FB}"/>
+              </a:ext>
+            </a:extLst>
+          </p:cNvPr>
+          <p:cNvSpPr txBox="1">
+            <a:spLocks/>
+          </p:cNvSpPr>
+          <p:nvPr/>
+        </p:nvSpPr>
+        <p:spPr>
+          <a:xfrm>
+            <a:off x="9140345" y="6073844"/>
+            <a:ext cx="1532830" cy="801636"/>
+          </a:xfrm>
+          <a:prstGeom prst="rect">
+            <a:avLst/>
+          </a:prstGeom>
+        </p:spPr>
+        <p:txBody>
+          <a:bodyPr vert="horz" lIns="91440" tIns="45720" rIns="91440" bIns="45720" rtlCol="0">
+            <a:normAutofit/>
+          </a:bodyPr>
+          <a:lstStyle>
+            <a:lvl1pPr marL="0" indent="0" algn="ctr" defTabSz="914400" rtl="0" eaLnBrk="1" latinLnBrk="0" hangingPunct="1">
+              <a:spcBef>
+                <a:spcPct val="20000"/>
+              </a:spcBef>
+              <a:buFont typeface="Arial" pitchFamily="34" charset="0"/>
+              <a:buNone/>
+              <a:defRPr sz="3200" kern="1200">
+                <a:solidFill>
+                  <a:schemeClr val="tx1">
+                    <a:tint val="75000"/>
+                  </a:schemeClr>
+                </a:solidFill>
+                <a:latin typeface="+mn-lt"/>
+                <a:ea typeface="+mn-ea"/>
+                <a:cs typeface="+mn-cs"/>
+              </a:defRPr>
+            </a:lvl1pPr>
+            <a:lvl2pPr marL="457200" indent="0" algn="ctr" defTabSz="914400" rtl="0" eaLnBrk="1" latinLnBrk="0" hangingPunct="1">
+              <a:spcBef>
+                <a:spcPct val="20000"/>
+              </a:spcBef>
+              <a:buFont typeface="Arial" pitchFamily="34" charset="0"/>
+              <a:buNone/>
+              <a:defRPr sz="2800" kern="1200">
+                <a:solidFill>
+                  <a:schemeClr val="tx1">
+                    <a:tint val="75000"/>
+                  </a:schemeClr>
+                </a:solidFill>
+                <a:latin typeface="+mn-lt"/>
+                <a:ea typeface="+mn-ea"/>
+                <a:cs typeface="+mn-cs"/>
+              </a:defRPr>
+            </a:lvl2pPr>
+            <a:lvl3pPr marL="914400" indent="0" algn="ctr" defTabSz="914400" rtl="0" eaLnBrk="1" latinLnBrk="0" hangingPunct="1">
+              <a:spcBef>
+                <a:spcPct val="20000"/>
+              </a:spcBef>
+              <a:buFont typeface="Arial" pitchFamily="34" charset="0"/>
+              <a:buNone/>
+              <a:defRPr sz="2400" kern="1200">
+                <a:solidFill>
+                  <a:schemeClr val="tx1">
+                    <a:tint val="75000"/>
+                  </a:schemeClr>
+                </a:solidFill>
+                <a:latin typeface="+mn-lt"/>
+                <a:ea typeface="+mn-ea"/>
+                <a:cs typeface="+mn-cs"/>
+              </a:defRPr>
+            </a:lvl3pPr>
+            <a:lvl4pPr marL="1371600" indent="0" algn="ctr" defTabSz="914400" rtl="0" eaLnBrk="1" latinLnBrk="0" hangingPunct="1">
+              <a:spcBef>
+                <a:spcPct val="20000"/>
+              </a:spcBef>
+              <a:buFont typeface="Arial" pitchFamily="34" charset="0"/>
+              <a:buNone/>
+              <a:defRPr sz="2000" kern="1200">
+                <a:solidFill>
+                  <a:schemeClr val="tx1">
+                    <a:tint val="75000"/>
+                  </a:schemeClr>
+                </a:solidFill>
+                <a:latin typeface="+mn-lt"/>
+                <a:ea typeface="+mn-ea"/>
+                <a:cs typeface="+mn-cs"/>
+              </a:defRPr>
+            </a:lvl4pPr>
+            <a:lvl5pPr marL="1828800" indent="0" algn="ctr" defTabSz="914400" rtl="0" eaLnBrk="1" latinLnBrk="0" hangingPunct="1">
+              <a:spcBef>
+                <a:spcPct val="20000"/>
+              </a:spcBef>
+              <a:buFont typeface="Arial" pitchFamily="34" charset="0"/>
+              <a:buNone/>
+              <a:defRPr sz="2000" kern="1200">
+                <a:solidFill>
+                  <a:schemeClr val="tx1">
+                    <a:tint val="75000"/>
+                  </a:schemeClr>
+                </a:solidFill>
+                <a:latin typeface="+mn-lt"/>
+                <a:ea typeface="+mn-ea"/>
+                <a:cs typeface="+mn-cs"/>
+              </a:defRPr>
+            </a:lvl5pPr>
+            <a:lvl6pPr marL="2286000" indent="0" algn="ctr" defTabSz="914400" rtl="0" eaLnBrk="1" latinLnBrk="0" hangingPunct="1">
+              <a:spcBef>
+                <a:spcPct val="20000"/>
+              </a:spcBef>
+              <a:buFont typeface="Arial" pitchFamily="34" charset="0"/>
+              <a:buNone/>
+              <a:defRPr sz="2000" kern="1200">
+                <a:solidFill>
+                  <a:schemeClr val="tx1">
+                    <a:tint val="75000"/>
+                  </a:schemeClr>
+                </a:solidFill>
+                <a:latin typeface="+mn-lt"/>
+                <a:ea typeface="+mn-ea"/>
+                <a:cs typeface="+mn-cs"/>
+              </a:defRPr>
+            </a:lvl6pPr>
+            <a:lvl7pPr marL="2743200" indent="0" algn="ctr" defTabSz="914400" rtl="0" eaLnBrk="1" latinLnBrk="0" hangingPunct="1">
+              <a:spcBef>
+                <a:spcPct val="20000"/>
+              </a:spcBef>
+              <a:buFont typeface="Arial" pitchFamily="34" charset="0"/>
+              <a:buNone/>
+              <a:defRPr sz="2000" kern="1200">
+                <a:solidFill>
+                  <a:schemeClr val="tx1">
+                    <a:tint val="75000"/>
+                  </a:schemeClr>
+                </a:solidFill>
+                <a:latin typeface="+mn-lt"/>
+                <a:ea typeface="+mn-ea"/>
+                <a:cs typeface="+mn-cs"/>
+              </a:defRPr>
+            </a:lvl7pPr>
+            <a:lvl8pPr marL="3200400" indent="0" algn="ctr" defTabSz="914400" rtl="0" eaLnBrk="1" latinLnBrk="0" hangingPunct="1">
+              <a:spcBef>
+                <a:spcPct val="20000"/>
+              </a:spcBef>
+              <a:buFont typeface="Arial" pitchFamily="34" charset="0"/>
+              <a:buNone/>
+              <a:defRPr sz="2000" kern="1200">
+                <a:solidFill>
+                  <a:schemeClr val="tx1">
+                    <a:tint val="75000"/>
+                  </a:schemeClr>
+                </a:solidFill>
+                <a:latin typeface="+mn-lt"/>
+                <a:ea typeface="+mn-ea"/>
+                <a:cs typeface="+mn-cs"/>
+              </a:defRPr>
+            </a:lvl8pPr>
+            <a:lvl9pPr marL="3657600" indent="0" algn="ctr" defTabSz="914400" rtl="0" eaLnBrk="1" latinLnBrk="0" hangingPunct="1">
+              <a:spcBef>
+                <a:spcPct val="20000"/>
+              </a:spcBef>
+              <a:buFont typeface="Arial" pitchFamily="34" charset="0"/>
+              <a:buNone/>
+              <a:defRPr sz="2000" kern="1200">
+                <a:solidFill>
+                  <a:schemeClr val="tx1">
+                    <a:tint val="75000"/>
+                  </a:schemeClr>
+                </a:solidFill>
+                <a:latin typeface="+mn-lt"/>
+                <a:ea typeface="+mn-ea"/>
+                <a:cs typeface="+mn-cs"/>
+              </a:defRPr>
+            </a:lvl9pPr>
+          </a:lstStyle>
+          <a:p>
+            <a:r>
+              <a:rPr lang="en-US" sz="1600" dirty="0">
+                <a:solidFill>
+                  <a:schemeClr val="tx1"/>
+                </a:solidFill>
+              </a:rPr>
+              <a:t>RIGHT</a:t>
+            </a:r>
+          </a:p>
+        </p:txBody>
+      </p:sp>
+      <p:sp>
+        <p:nvSpPr>
+          <p:cNvPr id="6" name="Right Arrow 5">
+            <a:extLst>
+              <a:ext uri="{FF2B5EF4-FFF2-40B4-BE49-F238E27FC236}">
+                <a16:creationId xmlns:a16="http://schemas.microsoft.com/office/drawing/2014/main" id="{E505ED16-B2E8-4140-B53D-56027D0A90C5}"/>
+              </a:ext>
+            </a:extLst>
+          </p:cNvPr>
+          <p:cNvSpPr/>
+          <p:nvPr/>
+        </p:nvSpPr>
+        <p:spPr>
+          <a:xfrm>
+            <a:off x="9637318" y="6391827"/>
+            <a:ext cx="640200" cy="289763"/>
+          </a:xfrm>
+          <a:prstGeom prst="rightArrow">
+            <a:avLst/>
+          </a:prstGeom>
+          <a:solidFill>
+            <a:schemeClr val="tx1"/>
+          </a:solidFill>
+          <a:ln>
+            <a:noFill/>
+          </a:ln>
+        </p:spPr>
+        <p:style>
+          <a:lnRef idx="1">
+            <a:schemeClr val="accent1"/>
+          </a:lnRef>
+          <a:fillRef idx="3">
+            <a:schemeClr val="accent1"/>
+          </a:fillRef>
+          <a:effectRef idx="2">
+            <a:schemeClr val="accent1"/>
+          </a:effectRef>
+          <a:fontRef idx="minor">
+            <a:schemeClr val="lt1"/>
+          </a:fontRef>
+        </p:style>
+        <p:txBody>
+          <a:bodyPr rtlCol="0" anchor="ctr"/>
+          <a:lstStyle/>
+          <a:p>
+            <a:pPr algn="ctr"/>
+            <a:endParaRPr lang="en-US"/>
+          </a:p>
+        </p:txBody>
+      </p:sp>
+      <p:sp>
+        <p:nvSpPr>
+          <p:cNvPr id="7" name="Subtitle 8">
+            <a:extLst>
+              <a:ext uri="{FF2B5EF4-FFF2-40B4-BE49-F238E27FC236}">
+                <a16:creationId xmlns:a16="http://schemas.microsoft.com/office/drawing/2014/main" id="{4BDF4734-B63C-DF44-8671-1E43AFCD02DC}"/>
+              </a:ext>
+            </a:extLst>
+          </p:cNvPr>
+          <p:cNvSpPr txBox="1">
+            <a:spLocks/>
+          </p:cNvSpPr>
+          <p:nvPr/>
+        </p:nvSpPr>
+        <p:spPr>
+          <a:xfrm>
+            <a:off x="1518826" y="6073844"/>
+            <a:ext cx="1532830" cy="801636"/>
+          </a:xfrm>
+          <a:prstGeom prst="rect">
+            <a:avLst/>
+          </a:prstGeom>
+        </p:spPr>
+        <p:txBody>
+          <a:bodyPr vert="horz" lIns="91440" tIns="45720" rIns="91440" bIns="45720" rtlCol="0">
+            <a:normAutofit/>
+          </a:bodyPr>
+          <a:lstStyle>
+            <a:lvl1pPr marL="0" indent="0" algn="ctr" defTabSz="914400" rtl="0" eaLnBrk="1" latinLnBrk="0" hangingPunct="1">
+              <a:spcBef>
+                <a:spcPct val="20000"/>
+              </a:spcBef>
+              <a:buFont typeface="Arial" pitchFamily="34" charset="0"/>
+              <a:buNone/>
+              <a:defRPr sz="3200" kern="1200">
+                <a:solidFill>
+                  <a:schemeClr val="tx1">
+                    <a:tint val="75000"/>
+                  </a:schemeClr>
+                </a:solidFill>
+                <a:latin typeface="+mn-lt"/>
+                <a:ea typeface="+mn-ea"/>
+                <a:cs typeface="+mn-cs"/>
+              </a:defRPr>
+            </a:lvl1pPr>
+            <a:lvl2pPr marL="457200" indent="0" algn="ctr" defTabSz="914400" rtl="0" eaLnBrk="1" latinLnBrk="0" hangingPunct="1">
+              <a:spcBef>
+                <a:spcPct val="20000"/>
+              </a:spcBef>
+              <a:buFont typeface="Arial" pitchFamily="34" charset="0"/>
+              <a:buNone/>
+              <a:defRPr sz="2800" kern="1200">
+                <a:solidFill>
+                  <a:schemeClr val="tx1">
+                    <a:tint val="75000"/>
+                  </a:schemeClr>
+                </a:solidFill>
+                <a:latin typeface="+mn-lt"/>
+                <a:ea typeface="+mn-ea"/>
+                <a:cs typeface="+mn-cs"/>
+              </a:defRPr>
+            </a:lvl2pPr>
+            <a:lvl3pPr marL="914400" indent="0" algn="ctr" defTabSz="914400" rtl="0" eaLnBrk="1" latinLnBrk="0" hangingPunct="1">
+              <a:spcBef>
+                <a:spcPct val="20000"/>
+              </a:spcBef>
+              <a:buFont typeface="Arial" pitchFamily="34" charset="0"/>
+              <a:buNone/>
+              <a:defRPr sz="2400" kern="1200">
+                <a:solidFill>
+                  <a:schemeClr val="tx1">
+                    <a:tint val="75000"/>
+                  </a:schemeClr>
+                </a:solidFill>
+                <a:latin typeface="+mn-lt"/>
+                <a:ea typeface="+mn-ea"/>
+                <a:cs typeface="+mn-cs"/>
+              </a:defRPr>
+            </a:lvl3pPr>
+            <a:lvl4pPr marL="1371600" indent="0" algn="ctr" defTabSz="914400" rtl="0" eaLnBrk="1" latinLnBrk="0" hangingPunct="1">
+              <a:spcBef>
+                <a:spcPct val="20000"/>
+              </a:spcBef>
+              <a:buFont typeface="Arial" pitchFamily="34" charset="0"/>
+              <a:buNone/>
+              <a:defRPr sz="2000" kern="1200">
+                <a:solidFill>
+                  <a:schemeClr val="tx1">
+                    <a:tint val="75000"/>
+                  </a:schemeClr>
+                </a:solidFill>
+                <a:latin typeface="+mn-lt"/>
+                <a:ea typeface="+mn-ea"/>
+                <a:cs typeface="+mn-cs"/>
+              </a:defRPr>
+            </a:lvl4pPr>
+            <a:lvl5pPr marL="1828800" indent="0" algn="ctr" defTabSz="914400" rtl="0" eaLnBrk="1" latinLnBrk="0" hangingPunct="1">
+              <a:spcBef>
+                <a:spcPct val="20000"/>
+              </a:spcBef>
+              <a:buFont typeface="Arial" pitchFamily="34" charset="0"/>
+              <a:buNone/>
+              <a:defRPr sz="2000" kern="1200">
+                <a:solidFill>
+                  <a:schemeClr val="tx1">
+                    <a:tint val="75000"/>
+                  </a:schemeClr>
+                </a:solidFill>
+                <a:latin typeface="+mn-lt"/>
+                <a:ea typeface="+mn-ea"/>
+                <a:cs typeface="+mn-cs"/>
+              </a:defRPr>
+            </a:lvl5pPr>
+            <a:lvl6pPr marL="2286000" indent="0" algn="ctr" defTabSz="914400" rtl="0" eaLnBrk="1" latinLnBrk="0" hangingPunct="1">
+              <a:spcBef>
+                <a:spcPct val="20000"/>
+              </a:spcBef>
+              <a:buFont typeface="Arial" pitchFamily="34" charset="0"/>
+              <a:buNone/>
+              <a:defRPr sz="2000" kern="1200">
+                <a:solidFill>
+                  <a:schemeClr val="tx1">
+                    <a:tint val="75000"/>
+                  </a:schemeClr>
+                </a:solidFill>
+                <a:latin typeface="+mn-lt"/>
+                <a:ea typeface="+mn-ea"/>
+                <a:cs typeface="+mn-cs"/>
+              </a:defRPr>
+            </a:lvl6pPr>
+            <a:lvl7pPr marL="2743200" indent="0" algn="ctr" defTabSz="914400" rtl="0" eaLnBrk="1" latinLnBrk="0" hangingPunct="1">
+              <a:spcBef>
+                <a:spcPct val="20000"/>
+              </a:spcBef>
+              <a:buFont typeface="Arial" pitchFamily="34" charset="0"/>
+              <a:buNone/>
+              <a:defRPr sz="2000" kern="1200">
+                <a:solidFill>
+                  <a:schemeClr val="tx1">
+                    <a:tint val="75000"/>
+                  </a:schemeClr>
+                </a:solidFill>
+                <a:latin typeface="+mn-lt"/>
+                <a:ea typeface="+mn-ea"/>
+                <a:cs typeface="+mn-cs"/>
+              </a:defRPr>
+            </a:lvl7pPr>
+            <a:lvl8pPr marL="3200400" indent="0" algn="ctr" defTabSz="914400" rtl="0" eaLnBrk="1" latinLnBrk="0" hangingPunct="1">
+              <a:spcBef>
+                <a:spcPct val="20000"/>
+              </a:spcBef>
+              <a:buFont typeface="Arial" pitchFamily="34" charset="0"/>
+              <a:buNone/>
+              <a:defRPr sz="2000" kern="1200">
+                <a:solidFill>
+                  <a:schemeClr val="tx1">
+                    <a:tint val="75000"/>
+                  </a:schemeClr>
+                </a:solidFill>
+                <a:latin typeface="+mn-lt"/>
+                <a:ea typeface="+mn-ea"/>
+                <a:cs typeface="+mn-cs"/>
+              </a:defRPr>
+            </a:lvl8pPr>
+            <a:lvl9pPr marL="3657600" indent="0" algn="ctr" defTabSz="914400" rtl="0" eaLnBrk="1" latinLnBrk="0" hangingPunct="1">
+              <a:spcBef>
+                <a:spcPct val="20000"/>
+              </a:spcBef>
+              <a:buFont typeface="Arial" pitchFamily="34" charset="0"/>
+              <a:buNone/>
+              <a:defRPr sz="2000" kern="1200">
+                <a:solidFill>
+                  <a:schemeClr val="tx1">
+                    <a:tint val="75000"/>
+                  </a:schemeClr>
+                </a:solidFill>
+                <a:latin typeface="+mn-lt"/>
+                <a:ea typeface="+mn-ea"/>
+                <a:cs typeface="+mn-cs"/>
+              </a:defRPr>
+            </a:lvl9pPr>
+          </a:lstStyle>
+          <a:p>
+            <a:r>
+              <a:rPr lang="en-US" sz="1600" dirty="0">
+                <a:solidFill>
+                  <a:schemeClr val="tx1"/>
+                </a:solidFill>
+              </a:rPr>
+              <a:t>LEFT</a:t>
+            </a:r>
+          </a:p>
+        </p:txBody>
+      </p:sp>
+      <p:sp>
+        <p:nvSpPr>
+          <p:cNvPr id="8" name="Right Arrow 7">
+            <a:extLst>
+              <a:ext uri="{FF2B5EF4-FFF2-40B4-BE49-F238E27FC236}">
+                <a16:creationId xmlns:a16="http://schemas.microsoft.com/office/drawing/2014/main" id="{8E22DF06-D6BE-AB44-B261-74815089D5A0}"/>
+              </a:ext>
+            </a:extLst>
+          </p:cNvPr>
+          <p:cNvSpPr/>
+          <p:nvPr/>
+        </p:nvSpPr>
+        <p:spPr>
+          <a:xfrm rot="10800000">
+            <a:off x="1902125" y="6391827"/>
+            <a:ext cx="640200" cy="289763"/>
+          </a:xfrm>
+          <a:prstGeom prst="rightArrow">
+            <a:avLst/>
+          </a:prstGeom>
+          <a:solidFill>
+            <a:schemeClr val="tx1"/>
+          </a:solidFill>
+          <a:ln>
+            <a:noFill/>
+          </a:ln>
+        </p:spPr>
+        <p:style>
+          <a:lnRef idx="1">
+            <a:schemeClr val="accent1"/>
+          </a:lnRef>
+          <a:fillRef idx="3">
+            <a:schemeClr val="accent1"/>
+          </a:fillRef>
+          <a:effectRef idx="2">
+            <a:schemeClr val="accent1"/>
+          </a:effectRef>
+          <a:fontRef idx="minor">
+            <a:schemeClr val="lt1"/>
+          </a:fontRef>
+        </p:style>
+        <p:txBody>
+          <a:bodyPr rtlCol="0" anchor="ctr"/>
+          <a:lstStyle/>
+          <a:p>
+            <a:pPr algn="ctr"/>
+            <a:endParaRPr lang="en-US"/>
+          </a:p>
+        </p:txBody>
+      </p:sp>
+      <p:pic>
+        <p:nvPicPr>
+          <p:cNvPr id="9" name="Picture 8" descr="A screenshot of a computer&#10;&#10;Description automatically generated with medium confidence">
+            <a:extLst>
+              <a:ext uri="{FF2B5EF4-FFF2-40B4-BE49-F238E27FC236}">
+                <a16:creationId xmlns:a16="http://schemas.microsoft.com/office/drawing/2014/main" id="{39AECFE0-4DE0-A642-B84B-622F5F7928C9}"/>
+              </a:ext>
+            </a:extLst>
+          </p:cNvPr>
+          <p:cNvPicPr>
+            <a:picLocks noChangeAspect="1"/>
+          </p:cNvPicPr>
+          <p:nvPr/>
+        </p:nvPicPr>
+        <p:blipFill rotWithShape="1">
+          <a:blip r:embed="rId3"/>
+          <a:srcRect l="28990" t="25136" r="16970" b="67881"/>
+          <a:stretch/>
+        </p:blipFill>
+        <p:spPr>
+          <a:xfrm>
+            <a:off x="2542325" y="2690287"/>
+            <a:ext cx="6908866" cy="751241"/>
+          </a:xfrm>
+          <a:prstGeom prst="rect">
+            <a:avLst/>
+          </a:prstGeom>
+          <a:ln>
+            <a:solidFill>
+              <a:schemeClr val="tx1"/>
+            </a:solidFill>
+          </a:ln>
+        </p:spPr>
+      </p:pic>
+      <p:pic>
+        <p:nvPicPr>
+          <p:cNvPr id="11" name="Picture 10" descr="A screenshot of a computer&#10;&#10;Description automatically generated with medium confidence">
+            <a:extLst>
+              <a:ext uri="{FF2B5EF4-FFF2-40B4-BE49-F238E27FC236}">
+                <a16:creationId xmlns:a16="http://schemas.microsoft.com/office/drawing/2014/main" id="{D1E110C0-4239-7A4B-930B-CD80117D2CF9}"/>
+              </a:ext>
+            </a:extLst>
+          </p:cNvPr>
+          <p:cNvPicPr>
+            <a:picLocks noChangeAspect="1"/>
+          </p:cNvPicPr>
+          <p:nvPr/>
+        </p:nvPicPr>
+        <p:blipFill rotWithShape="1">
+          <a:blip r:embed="rId4"/>
+          <a:srcRect l="28635" t="31963" r="16724" b="61066"/>
+          <a:stretch/>
+        </p:blipFill>
+        <p:spPr>
+          <a:xfrm>
+            <a:off x="2542325" y="3459670"/>
+            <a:ext cx="6908866" cy="741751"/>
+          </a:xfrm>
+          <a:prstGeom prst="rect">
+            <a:avLst/>
+          </a:prstGeom>
+          <a:ln>
+            <a:solidFill>
+              <a:schemeClr val="tx1"/>
+            </a:solidFill>
+          </a:ln>
+        </p:spPr>
+      </p:pic>
+    </p:spTree>
+    <p:extLst>
+      <p:ext uri="{BB962C8B-B14F-4D97-AF65-F5344CB8AC3E}">
+        <p14:creationId xmlns:p14="http://schemas.microsoft.com/office/powerpoint/2010/main" val="3066544549"/>
+      </p:ext>
+    </p:extLst>
+  </p:cSld>
+  <p:clrMapOvr>
+    <a:masterClrMapping/>
+  </p:clrMapOvr>
+</p:sld>
+</file>
+
+<file path=ppt/slides/slide31.xml><?xml version="1.0" encoding="utf-8"?>
+<p:sld xmlns:a="http://schemas.openxmlformats.org/drawingml/2006/main" xmlns:r="http://schemas.openxmlformats.org/officeDocument/2006/relationships" xmlns:p="http://schemas.openxmlformats.org/presentationml/2006/main">
+  <p:cSld>
+    <p:bg>
+      <p:bgPr>
+        <a:solidFill>
+          <a:schemeClr val="bg1"/>
+        </a:solidFill>
+        <a:effectLst/>
+      </p:bgPr>
+    </p:bg>
+    <p:spTree>
+      <p:nvGrpSpPr>
+        <p:cNvPr id="1" name=""/>
+        <p:cNvGrpSpPr/>
+        <p:nvPr/>
+      </p:nvGrpSpPr>
+      <p:grpSpPr>
+        <a:xfrm>
+          <a:off x="0" y="0"/>
+          <a:ext cx="0" cy="0"/>
+          <a:chOff x="0" y="0"/>
+          <a:chExt cx="0" cy="0"/>
+        </a:xfrm>
+      </p:grpSpPr>
+      <p:sp>
+        <p:nvSpPr>
+          <p:cNvPr id="3" name="Content Placeholder 2"/>
+          <p:cNvSpPr>
+            <a:spLocks noGrp="1"/>
+          </p:cNvSpPr>
+          <p:nvPr>
+            <p:ph idx="1"/>
+          </p:nvPr>
+        </p:nvSpPr>
+        <p:spPr>
+          <a:xfrm>
             <a:off x="800060" y="712122"/>
             <a:ext cx="10591879" cy="1884219"/>
           </a:xfrm>
@@ -24369,7 +25182,7 @@
 </p:sld>
 </file>
 
-<file path=ppt/slides/slide31.xml><?xml version="1.0" encoding="utf-8"?>
+<file path=ppt/slides/slide32.xml><?xml version="1.0" encoding="utf-8"?>
 <p:sld xmlns:a="http://schemas.openxmlformats.org/drawingml/2006/main" xmlns:r="http://schemas.openxmlformats.org/officeDocument/2006/relationships" xmlns:p="http://schemas.openxmlformats.org/presentationml/2006/main">
   <p:cSld>
     <p:bg>

</xml_diff>